<commit_message>
+ 4 types of scheduling,updated ppt
</commit_message>
<xml_diff>
--- a/Spring-Boot-Application-with-Schedulers (1).pptx
+++ b/Spring-Boot-Application-with-Schedulers (1).pptx
@@ -5,7 +5,7 @@
     <p:sldMasterId id="2147483648" r:id="rId1"/>
   </p:sldMasterIdLst>
   <p:notesMasterIdLst>
-    <p:notesMasterId r:id="rId11"/>
+    <p:notesMasterId r:id="rId12"/>
   </p:notesMasterIdLst>
   <p:sldIdLst>
     <p:sldId id="256" r:id="rId2"/>
@@ -17,6 +17,7 @@
     <p:sldId id="262" r:id="rId8"/>
     <p:sldId id="263" r:id="rId9"/>
     <p:sldId id="264" r:id="rId10"/>
+    <p:sldId id="265" r:id="rId11"/>
   </p:sldIdLst>
   <p:sldSz cx="14630400" cy="8229600"/>
   <p:notesSz cx="8229600" cy="14630400"/>
@@ -145,7 +146,7 @@
     </p:spTree>
     <p:extLst>
       <p:ext uri="{BB962C8B-B14F-4D97-AF65-F5344CB8AC3E}">
-        <p14:creationId xmlns:p14="http://schemas.microsoft.com/office/powerpoint/2010/main" val="533011342"/>
+        <p14:creationId xmlns:p14="http://schemas.microsoft.com/office/powerpoint/2010/main" val="1246601148"/>
       </p:ext>
     </p:extLst>
   </p:cSld>
@@ -311,6 +312,90 @@
             <a:fld id="{F7021451-1387-4CA6-816F-3879F97B5CBC}" type="slidenum">
               <a:rPr lang="en-US"/>
               <a:t>1</a:t>
+            </a:fld>
+            <a:endParaRPr lang="en-US"/>
+          </a:p>
+        </p:txBody>
+      </p:sp>
+    </p:spTree>
+    <p:extLst>
+      <p:ext uri="{BB962C8B-B14F-4D97-AF65-F5344CB8AC3E}">
+        <p14:creationId xmlns:p14="http://schemas.microsoft.com/office/powerpoint/2010/main" val="1024086991"/>
+      </p:ext>
+    </p:extLst>
+  </p:cSld>
+  <p:clrMapOvr>
+    <a:masterClrMapping/>
+  </p:clrMapOvr>
+</p:notes>
+</file>
+
+<file path=ppt/notesSlides/notesSlide10.xml><?xml version="1.0" encoding="utf-8"?>
+<p:notes xmlns:a="http://schemas.openxmlformats.org/drawingml/2006/main" xmlns:r="http://schemas.openxmlformats.org/officeDocument/2006/relationships" xmlns:p="http://schemas.openxmlformats.org/presentationml/2006/main">
+  <p:cSld>
+    <p:spTree>
+      <p:nvGrpSpPr>
+        <p:cNvPr id="1" name=""/>
+        <p:cNvGrpSpPr/>
+        <p:nvPr/>
+      </p:nvGrpSpPr>
+      <p:grpSpPr>
+        <a:xfrm>
+          <a:off x="0" y="0"/>
+          <a:ext cx="0" cy="0"/>
+          <a:chOff x="0" y="0"/>
+          <a:chExt cx="0" cy="0"/>
+        </a:xfrm>
+      </p:grpSpPr>
+      <p:sp>
+        <p:nvSpPr>
+          <p:cNvPr id="2" name="Slide Image Placeholder 1"/>
+          <p:cNvSpPr>
+            <a:spLocks noGrp="1" noRot="1" noChangeAspect="1"/>
+          </p:cNvSpPr>
+          <p:nvPr>
+            <p:ph type="sldImg"/>
+          </p:nvPr>
+        </p:nvSpPr>
+        <p:spPr/>
+      </p:sp>
+      <p:sp>
+        <p:nvSpPr>
+          <p:cNvPr id="3" name="Notes Placeholder 2"/>
+          <p:cNvSpPr>
+            <a:spLocks noGrp="1"/>
+          </p:cNvSpPr>
+          <p:nvPr>
+            <p:ph type="body" idx="1"/>
+          </p:nvPr>
+        </p:nvSpPr>
+        <p:spPr/>
+        <p:txBody>
+          <a:bodyPr/>
+          <a:lstStyle/>
+          <a:p>
+            <a:endParaRPr lang="en-US" dirty="0"/>
+          </a:p>
+        </p:txBody>
+      </p:sp>
+      <p:sp>
+        <p:nvSpPr>
+          <p:cNvPr id="4" name="Slide Number Placeholder 3"/>
+          <p:cNvSpPr>
+            <a:spLocks noGrp="1"/>
+          </p:cNvSpPr>
+          <p:nvPr>
+            <p:ph type="sldNum" sz="quarter" idx="10"/>
+          </p:nvPr>
+        </p:nvSpPr>
+        <p:spPr/>
+        <p:txBody>
+          <a:bodyPr/>
+          <a:lstStyle/>
+          <a:p>
+            <a:fld id="{F7021451-1387-4CA6-816F-3879F97B5CBC}" type="slidenum">
+              <a:rPr lang="en-US"/>
+              <a:t>10</a:t>
             </a:fld>
             <a:endParaRPr lang="en-US"/>
           </a:p>
@@ -1486,6 +1571,437 @@
 </p:sld>
 </file>
 
+<file path=ppt/slides/slide10.xml><?xml version="1.0" encoding="utf-8"?>
+<p:sld xmlns:a="http://schemas.openxmlformats.org/drawingml/2006/main" xmlns:r="http://schemas.openxmlformats.org/officeDocument/2006/relationships" xmlns:p="http://schemas.openxmlformats.org/presentationml/2006/main">
+  <p:cSld name="Slide 10">
+    <p:spTree>
+      <p:nvGrpSpPr>
+        <p:cNvPr id="1" name=""/>
+        <p:cNvGrpSpPr/>
+        <p:nvPr/>
+      </p:nvGrpSpPr>
+      <p:grpSpPr>
+        <a:xfrm>
+          <a:off x="0" y="0"/>
+          <a:ext cx="0" cy="0"/>
+          <a:chOff x="0" y="0"/>
+          <a:chExt cx="0" cy="0"/>
+        </a:xfrm>
+      </p:grpSpPr>
+      <p:sp>
+        <p:nvSpPr>
+          <p:cNvPr id="2" name="Shape 0"/>
+          <p:cNvSpPr/>
+          <p:nvPr/>
+        </p:nvSpPr>
+        <p:spPr>
+          <a:xfrm>
+            <a:off x="0" y="0"/>
+            <a:ext cx="14630400" cy="8229600"/>
+          </a:xfrm>
+          <a:prstGeom prst="rect">
+            <a:avLst/>
+          </a:prstGeom>
+          <a:solidFill>
+            <a:srgbClr val="121212"/>
+          </a:solidFill>
+          <a:ln/>
+        </p:spPr>
+      </p:sp>
+      <p:sp>
+        <p:nvSpPr>
+          <p:cNvPr id="3" name="Shape 1"/>
+          <p:cNvSpPr/>
+          <p:nvPr/>
+        </p:nvSpPr>
+        <p:spPr>
+          <a:xfrm>
+            <a:off x="0" y="0"/>
+            <a:ext cx="14630400" cy="8229600"/>
+          </a:xfrm>
+          <a:prstGeom prst="rect">
+            <a:avLst/>
+          </a:prstGeom>
+          <a:solidFill>
+            <a:srgbClr val="1F1F1F"/>
+          </a:solidFill>
+          <a:ln/>
+        </p:spPr>
+      </p:sp>
+      <p:sp>
+        <p:nvSpPr>
+          <p:cNvPr id="4" name="Text 2"/>
+          <p:cNvSpPr/>
+          <p:nvPr/>
+        </p:nvSpPr>
+        <p:spPr>
+          <a:xfrm>
+            <a:off x="864037" y="1857256"/>
+            <a:ext cx="6172200" cy="771525"/>
+          </a:xfrm>
+          <a:prstGeom prst="rect">
+            <a:avLst/>
+          </a:prstGeom>
+          <a:noFill/>
+          <a:ln/>
+        </p:spPr>
+        <p:txBody>
+          <a:bodyPr wrap="none" rtlCol="0" anchor="t"/>
+          <a:lstStyle/>
+          <a:p>
+            <a:pPr marL="0" indent="0">
+              <a:lnSpc>
+                <a:spcPts val="6075"/>
+              </a:lnSpc>
+              <a:buNone/>
+            </a:pPr>
+            <a:r>
+              <a:rPr lang="en-US" sz="4860" kern="0" spc="-49" dirty="0">
+                <a:solidFill>
+                  <a:srgbClr val="FA95AF"/>
+                </a:solidFill>
+                <a:latin typeface="Anton" pitchFamily="34" charset="0"/>
+                <a:ea typeface="Anton" pitchFamily="34" charset="-122"/>
+                <a:cs typeface="Anton" pitchFamily="34" charset="-120"/>
+              </a:rPr>
+              <a:t>Conclusion</a:t>
+            </a:r>
+            <a:endParaRPr lang="en-US" sz="4860" dirty="0"/>
+          </a:p>
+        </p:txBody>
+      </p:sp>
+      <p:pic>
+        <p:nvPicPr>
+          <p:cNvPr id="5" name="Image 0" descr="preencoded.png"/>
+          <p:cNvPicPr>
+            <a:picLocks noChangeAspect="1"/>
+          </p:cNvPicPr>
+          <p:nvPr/>
+        </p:nvPicPr>
+        <p:blipFill>
+          <a:blip r:embed="rId3"/>
+          <a:stretch>
+            <a:fillRect/>
+          </a:stretch>
+        </p:blipFill>
+        <p:spPr>
+          <a:xfrm>
+            <a:off x="864037" y="2999065"/>
+            <a:ext cx="617220" cy="617220"/>
+          </a:xfrm>
+          <a:prstGeom prst="rect">
+            <a:avLst/>
+          </a:prstGeom>
+        </p:spPr>
+      </p:pic>
+      <p:sp>
+        <p:nvSpPr>
+          <p:cNvPr id="6" name="Text 3"/>
+          <p:cNvSpPr/>
+          <p:nvPr/>
+        </p:nvSpPr>
+        <p:spPr>
+          <a:xfrm>
+            <a:off x="864037" y="3863102"/>
+            <a:ext cx="3135154" cy="385763"/>
+          </a:xfrm>
+          <a:prstGeom prst="rect">
+            <a:avLst/>
+          </a:prstGeom>
+          <a:noFill/>
+          <a:ln/>
+        </p:spPr>
+        <p:txBody>
+          <a:bodyPr wrap="none" rtlCol="0" anchor="t"/>
+          <a:lstStyle/>
+          <a:p>
+            <a:pPr marL="0" indent="0" algn="l">
+              <a:lnSpc>
+                <a:spcPts val="3038"/>
+              </a:lnSpc>
+              <a:buNone/>
+            </a:pPr>
+            <a:r>
+              <a:rPr lang="en-US" sz="2430" kern="0" spc="-24" dirty="0">
+                <a:solidFill>
+                  <a:srgbClr val="E0D6DE"/>
+                </a:solidFill>
+                <a:latin typeface="Anton" pitchFamily="34" charset="0"/>
+                <a:ea typeface="Anton" pitchFamily="34" charset="-122"/>
+                <a:cs typeface="Anton" pitchFamily="34" charset="-120"/>
+              </a:rPr>
+              <a:t>Automation and Efficiency</a:t>
+            </a:r>
+            <a:endParaRPr lang="en-US" sz="2430" dirty="0"/>
+          </a:p>
+        </p:txBody>
+      </p:sp>
+      <p:sp>
+        <p:nvSpPr>
+          <p:cNvPr id="7" name="Text 4"/>
+          <p:cNvSpPr/>
+          <p:nvPr/>
+        </p:nvSpPr>
+        <p:spPr>
+          <a:xfrm>
+            <a:off x="864037" y="4396978"/>
+            <a:ext cx="4053840" cy="1580198"/>
+          </a:xfrm>
+          <a:prstGeom prst="rect">
+            <a:avLst/>
+          </a:prstGeom>
+          <a:noFill/>
+          <a:ln/>
+        </p:spPr>
+        <p:txBody>
+          <a:bodyPr wrap="square" rtlCol="0" anchor="t"/>
+          <a:lstStyle/>
+          <a:p>
+            <a:pPr marL="0" indent="0" algn="l">
+              <a:lnSpc>
+                <a:spcPts val="3110"/>
+              </a:lnSpc>
+              <a:buNone/>
+            </a:pPr>
+            <a:r>
+              <a:rPr lang="en-US" sz="1944" kern="0" spc="-39" dirty="0">
+                <a:solidFill>
+                  <a:srgbClr val="E0D6DE"/>
+                </a:solidFill>
+                <a:latin typeface="Fira Sans" pitchFamily="34" charset="0"/>
+                <a:ea typeface="Fira Sans" pitchFamily="34" charset="-122"/>
+                <a:cs typeface="Fira Sans" pitchFamily="34" charset="-120"/>
+              </a:rPr>
+              <a:t>Schedulers play a crucial role in automating repetitive tasks, enhancing application efficiency, and streamlining workflows.</a:t>
+            </a:r>
+            <a:endParaRPr lang="en-US" sz="1944" dirty="0"/>
+          </a:p>
+        </p:txBody>
+      </p:sp>
+      <p:pic>
+        <p:nvPicPr>
+          <p:cNvPr id="8" name="Image 1" descr="preencoded.png"/>
+          <p:cNvPicPr>
+            <a:picLocks noChangeAspect="1"/>
+          </p:cNvPicPr>
+          <p:nvPr/>
+        </p:nvPicPr>
+        <p:blipFill>
+          <a:blip r:embed="rId4"/>
+          <a:stretch>
+            <a:fillRect/>
+          </a:stretch>
+        </p:blipFill>
+        <p:spPr>
+          <a:xfrm>
+            <a:off x="5288161" y="2999065"/>
+            <a:ext cx="617220" cy="617220"/>
+          </a:xfrm>
+          <a:prstGeom prst="rect">
+            <a:avLst/>
+          </a:prstGeom>
+        </p:spPr>
+      </p:pic>
+      <p:sp>
+        <p:nvSpPr>
+          <p:cNvPr id="9" name="Text 5"/>
+          <p:cNvSpPr/>
+          <p:nvPr/>
+        </p:nvSpPr>
+        <p:spPr>
+          <a:xfrm>
+            <a:off x="5288161" y="3863102"/>
+            <a:ext cx="3086100" cy="385763"/>
+          </a:xfrm>
+          <a:prstGeom prst="rect">
+            <a:avLst/>
+          </a:prstGeom>
+          <a:noFill/>
+          <a:ln/>
+        </p:spPr>
+        <p:txBody>
+          <a:bodyPr wrap="none" rtlCol="0" anchor="t"/>
+          <a:lstStyle/>
+          <a:p>
+            <a:pPr marL="0" indent="0" algn="l">
+              <a:lnSpc>
+                <a:spcPts val="3038"/>
+              </a:lnSpc>
+              <a:buNone/>
+            </a:pPr>
+            <a:r>
+              <a:rPr lang="en-US" sz="2430" kern="0" spc="-24" dirty="0">
+                <a:solidFill>
+                  <a:srgbClr val="E0D6DE"/>
+                </a:solidFill>
+                <a:latin typeface="Anton" pitchFamily="34" charset="0"/>
+                <a:ea typeface="Anton" pitchFamily="34" charset="-122"/>
+                <a:cs typeface="Anton" pitchFamily="34" charset="-120"/>
+              </a:rPr>
+              <a:t>Spring Boot Integration</a:t>
+            </a:r>
+            <a:endParaRPr lang="en-US" sz="2430" dirty="0"/>
+          </a:p>
+        </p:txBody>
+      </p:sp>
+      <p:sp>
+        <p:nvSpPr>
+          <p:cNvPr id="10" name="Text 6"/>
+          <p:cNvSpPr/>
+          <p:nvPr/>
+        </p:nvSpPr>
+        <p:spPr>
+          <a:xfrm>
+            <a:off x="5288161" y="4396978"/>
+            <a:ext cx="4053959" cy="1580198"/>
+          </a:xfrm>
+          <a:prstGeom prst="rect">
+            <a:avLst/>
+          </a:prstGeom>
+          <a:noFill/>
+          <a:ln/>
+        </p:spPr>
+        <p:txBody>
+          <a:bodyPr wrap="square" rtlCol="0" anchor="t"/>
+          <a:lstStyle/>
+          <a:p>
+            <a:pPr marL="0" indent="0" algn="l">
+              <a:lnSpc>
+                <a:spcPts val="3110"/>
+              </a:lnSpc>
+              <a:buNone/>
+            </a:pPr>
+            <a:r>
+              <a:rPr lang="en-US" sz="1944" kern="0" spc="-39" dirty="0">
+                <a:solidFill>
+                  <a:srgbClr val="E0D6DE"/>
+                </a:solidFill>
+                <a:latin typeface="Fira Sans" pitchFamily="34" charset="0"/>
+                <a:ea typeface="Fira Sans" pitchFamily="34" charset="-122"/>
+                <a:cs typeface="Fira Sans" pitchFamily="34" charset="-120"/>
+              </a:rPr>
+              <a:t>Spring Boot provides a robust and convenient framework for integrating scheduling mechanisms into your applications.</a:t>
+            </a:r>
+            <a:endParaRPr lang="en-US" sz="1944" dirty="0"/>
+          </a:p>
+        </p:txBody>
+      </p:sp>
+      <p:pic>
+        <p:nvPicPr>
+          <p:cNvPr id="11" name="Image 2" descr="preencoded.png"/>
+          <p:cNvPicPr>
+            <a:picLocks noChangeAspect="1"/>
+          </p:cNvPicPr>
+          <p:nvPr/>
+        </p:nvPicPr>
+        <p:blipFill>
+          <a:blip r:embed="rId5"/>
+          <a:stretch>
+            <a:fillRect/>
+          </a:stretch>
+        </p:blipFill>
+        <p:spPr>
+          <a:xfrm>
+            <a:off x="9712404" y="2999065"/>
+            <a:ext cx="617220" cy="617220"/>
+          </a:xfrm>
+          <a:prstGeom prst="rect">
+            <a:avLst/>
+          </a:prstGeom>
+        </p:spPr>
+      </p:pic>
+      <p:sp>
+        <p:nvSpPr>
+          <p:cNvPr id="12" name="Text 7"/>
+          <p:cNvSpPr/>
+          <p:nvPr/>
+        </p:nvSpPr>
+        <p:spPr>
+          <a:xfrm>
+            <a:off x="9712404" y="3863102"/>
+            <a:ext cx="3666530" cy="385763"/>
+          </a:xfrm>
+          <a:prstGeom prst="rect">
+            <a:avLst/>
+          </a:prstGeom>
+          <a:noFill/>
+          <a:ln/>
+        </p:spPr>
+        <p:txBody>
+          <a:bodyPr wrap="none" rtlCol="0" anchor="t"/>
+          <a:lstStyle/>
+          <a:p>
+            <a:pPr marL="0" indent="0" algn="l">
+              <a:lnSpc>
+                <a:spcPts val="3038"/>
+              </a:lnSpc>
+              <a:buNone/>
+            </a:pPr>
+            <a:r>
+              <a:rPr lang="en-US" sz="2430" kern="0" spc="-24" dirty="0">
+                <a:solidFill>
+                  <a:srgbClr val="E0D6DE"/>
+                </a:solidFill>
+                <a:latin typeface="Anton" pitchFamily="34" charset="0"/>
+                <a:ea typeface="Anton" pitchFamily="34" charset="-122"/>
+                <a:cs typeface="Anton" pitchFamily="34" charset="-120"/>
+              </a:rPr>
+              <a:t>Sample Project Demonstration</a:t>
+            </a:r>
+            <a:endParaRPr lang="en-US" sz="2430" dirty="0"/>
+          </a:p>
+        </p:txBody>
+      </p:sp>
+      <p:sp>
+        <p:nvSpPr>
+          <p:cNvPr id="13" name="Text 8"/>
+          <p:cNvSpPr/>
+          <p:nvPr/>
+        </p:nvSpPr>
+        <p:spPr>
+          <a:xfrm>
+            <a:off x="9712404" y="4396978"/>
+            <a:ext cx="4053840" cy="1975247"/>
+          </a:xfrm>
+          <a:prstGeom prst="rect">
+            <a:avLst/>
+          </a:prstGeom>
+          <a:noFill/>
+          <a:ln/>
+        </p:spPr>
+        <p:txBody>
+          <a:bodyPr wrap="square" rtlCol="0" anchor="t"/>
+          <a:lstStyle/>
+          <a:p>
+            <a:pPr marL="0" indent="0" algn="l">
+              <a:lnSpc>
+                <a:spcPts val="3110"/>
+              </a:lnSpc>
+              <a:buNone/>
+            </a:pPr>
+            <a:r>
+              <a:rPr lang="en-US" sz="1944" kern="0" spc="-39" dirty="0">
+                <a:solidFill>
+                  <a:srgbClr val="E0D6DE"/>
+                </a:solidFill>
+                <a:latin typeface="Fira Sans" pitchFamily="34" charset="0"/>
+                <a:ea typeface="Fira Sans" pitchFamily="34" charset="-122"/>
+                <a:cs typeface="Fira Sans" pitchFamily="34" charset="-120"/>
+              </a:rPr>
+              <a:t>The sample project showcased the practical application of scheduling concepts, providing a hands-on understanding of how to implement scheduled tasks.</a:t>
+            </a:r>
+            <a:endParaRPr lang="en-US" sz="1944" dirty="0"/>
+          </a:p>
+        </p:txBody>
+      </p:sp>
+    </p:spTree>
+  </p:cSld>
+  <p:clrMapOvr>
+    <a:masterClrMapping/>
+  </p:clrMapOvr>
+</p:sld>
+</file>
+
 <file path=ppt/slides/slide2.xml><?xml version="1.0" encoding="utf-8"?>
 <p:sld xmlns:a="http://schemas.openxmlformats.org/drawingml/2006/main" xmlns:r="http://schemas.openxmlformats.org/officeDocument/2006/relationships" xmlns:p="http://schemas.openxmlformats.org/presentationml/2006/main">
   <p:cSld name="Slide 2">
@@ -3128,7 +3644,7 @@
         </p:nvSpPr>
         <p:spPr>
           <a:xfrm>
-            <a:off x="0" y="0"/>
+            <a:off x="0" y="11151"/>
             <a:ext cx="14630400" cy="8229600"/>
           </a:xfrm>
           <a:prstGeom prst="rect">
@@ -4264,8 +4780,8 @@
         </p:nvSpPr>
         <p:spPr>
           <a:xfrm>
-            <a:off x="864037" y="2229564"/>
-            <a:ext cx="8080415" cy="771525"/>
+            <a:off x="864037" y="748903"/>
+            <a:ext cx="7129701" cy="771525"/>
           </a:xfrm>
           <a:prstGeom prst="rect">
             <a:avLst/>
@@ -4292,7 +4808,7 @@
                 <a:ea typeface="Anton" pitchFamily="34" charset="-122"/>
                 <a:cs typeface="Anton" pitchFamily="34" charset="-120"/>
               </a:rPr>
-              <a:t>Advanced Scheduling Techniques</a:t>
+              <a:t>Fixed Rate VS Fixed Delay</a:t>
             </a:r>
             <a:endParaRPr lang="en-US" sz="4860" dirty="0"/>
           </a:p>
@@ -4300,79 +4816,31 @@
       </p:sp>
       <p:sp>
         <p:nvSpPr>
-          <p:cNvPr id="5" name="Shape 3"/>
-          <p:cNvSpPr/>
-          <p:nvPr/>
-        </p:nvSpPr>
-        <p:spPr>
-          <a:xfrm>
-            <a:off x="864037" y="3371374"/>
-            <a:ext cx="12902327" cy="2628662"/>
-          </a:xfrm>
-          <a:prstGeom prst="roundRect">
-            <a:avLst>
-              <a:gd name="adj" fmla="val 1409"/>
-            </a:avLst>
-          </a:prstGeom>
-          <a:noFill/>
-          <a:ln w="15240">
-            <a:solidFill>
-              <a:srgbClr val="FFFFFF">
-                <a:alpha val="24000"/>
-              </a:srgbClr>
-            </a:solidFill>
-            <a:prstDash val="solid"/>
-          </a:ln>
-        </p:spPr>
-      </p:sp>
-      <p:sp>
-        <p:nvSpPr>
-          <p:cNvPr id="6" name="Shape 4"/>
-          <p:cNvSpPr/>
-          <p:nvPr/>
-        </p:nvSpPr>
-        <p:spPr>
-          <a:xfrm>
-            <a:off x="879277" y="3386614"/>
-            <a:ext cx="12870537" cy="706517"/>
-          </a:xfrm>
-          <a:prstGeom prst="rect">
-            <a:avLst/>
-          </a:prstGeom>
-          <a:solidFill>
-            <a:srgbClr val="FFFFFF">
-              <a:alpha val="4000"/>
-            </a:srgbClr>
-          </a:solidFill>
-          <a:ln/>
-        </p:spPr>
-      </p:sp>
-      <p:sp>
-        <p:nvSpPr>
-          <p:cNvPr id="7" name="Text 5"/>
-          <p:cNvSpPr/>
-          <p:nvPr/>
-        </p:nvSpPr>
-        <p:spPr>
-          <a:xfrm>
-            <a:off x="1127522" y="3542348"/>
-            <a:ext cx="3792260" cy="395049"/>
-          </a:xfrm>
-          <a:prstGeom prst="rect">
-            <a:avLst/>
-          </a:prstGeom>
-          <a:noFill/>
-          <a:ln/>
-        </p:spPr>
-        <p:txBody>
-          <a:bodyPr wrap="none" rtlCol="0" anchor="t"/>
-          <a:lstStyle/>
-          <a:p>
-            <a:pPr marL="0" indent="0">
+          <p:cNvPr id="5" name="Text 3"/>
+          <p:cNvSpPr/>
+          <p:nvPr/>
+        </p:nvSpPr>
+        <p:spPr>
+          <a:xfrm>
+            <a:off x="1258967" y="1977033"/>
+            <a:ext cx="5755124" cy="790099"/>
+          </a:xfrm>
+          <a:prstGeom prst="rect">
+            <a:avLst/>
+          </a:prstGeom>
+          <a:noFill/>
+          <a:ln/>
+        </p:spPr>
+        <p:txBody>
+          <a:bodyPr wrap="square" rtlCol="0" anchor="t"/>
+          <a:lstStyle/>
+          <a:p>
+            <a:pPr marL="342900" indent="-342900" algn="l">
               <a:lnSpc>
                 <a:spcPts val="3110"/>
               </a:lnSpc>
-              <a:buNone/>
+              <a:buSzPct val="100000"/>
+              <a:buChar char="•"/>
             </a:pPr>
             <a:r>
               <a:rPr lang="en-US" sz="1944" kern="0" spc="-39" dirty="0">
@@ -4383,7 +4851,7 @@
                 <a:ea typeface="Fira Sans" pitchFamily="34" charset="-122"/>
                 <a:cs typeface="Fira Sans" pitchFamily="34" charset="-120"/>
               </a:rPr>
-              <a:t>Technique</a:t>
+              <a:t>The task is executed at a fixed interval, measured from the start of the previous execution.</a:t>
             </a:r>
             <a:endParaRPr lang="en-US" sz="1944" dirty="0"/>
           </a:p>
@@ -4391,33 +4859,34 @@
       </p:sp>
       <p:sp>
         <p:nvSpPr>
-          <p:cNvPr id="8" name="Text 6"/>
-          <p:cNvSpPr/>
-          <p:nvPr/>
-        </p:nvSpPr>
-        <p:spPr>
-          <a:xfrm>
-            <a:off x="5421035" y="3542348"/>
-            <a:ext cx="3788450" cy="395049"/>
-          </a:xfrm>
-          <a:prstGeom prst="rect">
-            <a:avLst/>
-          </a:prstGeom>
-          <a:noFill/>
-          <a:ln/>
-        </p:spPr>
-        <p:txBody>
-          <a:bodyPr wrap="none" rtlCol="0" anchor="t"/>
-          <a:lstStyle/>
-          <a:p>
-            <a:pPr marL="0" indent="0">
+          <p:cNvPr id="6" name="Text 4"/>
+          <p:cNvSpPr/>
+          <p:nvPr/>
+        </p:nvSpPr>
+        <p:spPr>
+          <a:xfrm>
+            <a:off x="1258967" y="2853452"/>
+            <a:ext cx="5755124" cy="1975247"/>
+          </a:xfrm>
+          <a:prstGeom prst="rect">
+            <a:avLst/>
+          </a:prstGeom>
+          <a:noFill/>
+          <a:ln/>
+        </p:spPr>
+        <p:txBody>
+          <a:bodyPr wrap="square" rtlCol="0" anchor="t"/>
+          <a:lstStyle/>
+          <a:p>
+            <a:pPr marL="342900" indent="-342900" algn="l">
               <a:lnSpc>
                 <a:spcPts val="3110"/>
               </a:lnSpc>
-              <a:buNone/>
-            </a:pPr>
-            <a:r>
-              <a:rPr lang="en-US" sz="1944" kern="0" spc="-39" dirty="0">
+              <a:buSzPct val="100000"/>
+              <a:buChar char="•"/>
+            </a:pPr>
+            <a:r>
+              <a:rPr lang="en-US" sz="1944" b="1" kern="0" spc="-39" dirty="0">
                 <a:solidFill>
                   <a:srgbClr val="E0D6DE"/>
                 </a:solidFill>
@@ -4425,39 +4894,8 @@
                 <a:ea typeface="Fira Sans" pitchFamily="34" charset="-122"/>
                 <a:cs typeface="Fira Sans" pitchFamily="34" charset="-120"/>
               </a:rPr>
-              <a:t>Description</a:t>
-            </a:r>
-            <a:endParaRPr lang="en-US" sz="1944" dirty="0"/>
-          </a:p>
-        </p:txBody>
-      </p:sp>
-      <p:sp>
-        <p:nvSpPr>
-          <p:cNvPr id="9" name="Text 7"/>
-          <p:cNvSpPr/>
-          <p:nvPr/>
-        </p:nvSpPr>
-        <p:spPr>
-          <a:xfrm>
-            <a:off x="9710738" y="3542348"/>
-            <a:ext cx="3792260" cy="395049"/>
-          </a:xfrm>
-          <a:prstGeom prst="rect">
-            <a:avLst/>
-          </a:prstGeom>
-          <a:noFill/>
-          <a:ln/>
-        </p:spPr>
-        <p:txBody>
-          <a:bodyPr wrap="none" rtlCol="0" anchor="t"/>
-          <a:lstStyle/>
-          <a:p>
-            <a:pPr marL="0" indent="0">
-              <a:lnSpc>
-                <a:spcPts val="3110"/>
-              </a:lnSpc>
-              <a:buNone/>
-            </a:pPr>
+              <a:t>Example</a:t>
+            </a:r>
             <a:r>
               <a:rPr lang="en-US" sz="1944" kern="0" spc="-39" dirty="0">
                 <a:solidFill>
@@ -4467,61 +4905,22 @@
                 <a:ea typeface="Fira Sans" pitchFamily="34" charset="-122"/>
                 <a:cs typeface="Fira Sans" pitchFamily="34" charset="-120"/>
               </a:rPr>
-              <a:t>Example</a:t>
-            </a:r>
-            <a:endParaRPr lang="en-US" sz="1944" dirty="0"/>
-          </a:p>
-        </p:txBody>
-      </p:sp>
-      <p:sp>
-        <p:nvSpPr>
-          <p:cNvPr id="10" name="Shape 8"/>
-          <p:cNvSpPr/>
-          <p:nvPr/>
-        </p:nvSpPr>
-        <p:spPr>
-          <a:xfrm>
-            <a:off x="879277" y="4093131"/>
-            <a:ext cx="12870537" cy="1891665"/>
-          </a:xfrm>
-          <a:prstGeom prst="rect">
-            <a:avLst/>
-          </a:prstGeom>
-          <a:solidFill>
-            <a:srgbClr val="000000">
-              <a:alpha val="4000"/>
-            </a:srgbClr>
-          </a:solidFill>
-          <a:ln/>
-        </p:spPr>
-      </p:sp>
-      <p:sp>
-        <p:nvSpPr>
-          <p:cNvPr id="11" name="Text 9"/>
-          <p:cNvSpPr/>
-          <p:nvPr/>
-        </p:nvSpPr>
-        <p:spPr>
-          <a:xfrm>
-            <a:off x="1127522" y="4248864"/>
-            <a:ext cx="3792260" cy="395049"/>
-          </a:xfrm>
-          <a:prstGeom prst="rect">
-            <a:avLst/>
-          </a:prstGeom>
-          <a:noFill/>
-          <a:ln/>
-        </p:spPr>
-        <p:txBody>
-          <a:bodyPr wrap="none" rtlCol="0" anchor="t"/>
-          <a:lstStyle/>
-          <a:p>
-            <a:pPr marL="0" indent="0">
-              <a:lnSpc>
-                <a:spcPts val="3110"/>
-              </a:lnSpc>
-              <a:buNone/>
-            </a:pPr>
+              <a:t>: If a task is scheduled with </a:t>
+            </a:r>
+            <a:r>
+              <a:rPr lang="en-US" sz="1944" kern="0" spc="-39" dirty="0">
+                <a:solidFill>
+                  <a:srgbClr val="E0D6DE"/>
+                </a:solidFill>
+                <a:highlight>
+                  <a:srgbClr val="490315"/>
+                </a:highlight>
+                <a:latin typeface="Consolas" pitchFamily="34" charset="0"/>
+                <a:ea typeface="Consolas" pitchFamily="34" charset="-122"/>
+                <a:cs typeface="Consolas" pitchFamily="34" charset="-120"/>
+              </a:rPr>
+              <a:t>fixedRate = 5000</a:t>
+            </a:r>
             <a:r>
               <a:rPr lang="en-US" sz="1944" kern="0" spc="-39" dirty="0">
                 <a:solidFill>
@@ -4531,7 +4930,7 @@
                 <a:ea typeface="Fira Sans" pitchFamily="34" charset="-122"/>
                 <a:cs typeface="Fira Sans" pitchFamily="34" charset="-120"/>
               </a:rPr>
-              <a:t>Cron Expression Scheduling</a:t>
+              <a:t> (5 seconds), it will start every 5 seconds, even if the previous task hasn't finished yet (which could lead to overlapping executions if the task takes longer than 5 seconds).</a:t>
             </a:r>
             <a:endParaRPr lang="en-US" sz="1944" dirty="0"/>
           </a:p>
@@ -4539,14 +4938,69 @@
       </p:sp>
       <p:sp>
         <p:nvSpPr>
-          <p:cNvPr id="12" name="Text 10"/>
-          <p:cNvSpPr/>
-          <p:nvPr/>
-        </p:nvSpPr>
-        <p:spPr>
-          <a:xfrm>
-            <a:off x="5421035" y="4248864"/>
-            <a:ext cx="3788450" cy="1580198"/>
+          <p:cNvPr id="7" name="Text 5"/>
+          <p:cNvSpPr/>
+          <p:nvPr/>
+        </p:nvSpPr>
+        <p:spPr>
+          <a:xfrm>
+            <a:off x="864037" y="5050869"/>
+            <a:ext cx="6150054" cy="395049"/>
+          </a:xfrm>
+          <a:prstGeom prst="rect">
+            <a:avLst/>
+          </a:prstGeom>
+          <a:noFill/>
+          <a:ln/>
+        </p:spPr>
+        <p:txBody>
+          <a:bodyPr wrap="none" rtlCol="0" anchor="t"/>
+          <a:lstStyle/>
+          <a:p>
+            <a:pPr marL="0" indent="0">
+              <a:lnSpc>
+                <a:spcPts val="3110"/>
+              </a:lnSpc>
+              <a:buNone/>
+            </a:pPr>
+            <a:endParaRPr lang="en-US" sz="1944" dirty="0"/>
+          </a:p>
+        </p:txBody>
+      </p:sp>
+      <p:pic>
+        <p:nvPicPr>
+          <p:cNvPr id="8" name="Image 0" descr="preencoded.png"/>
+          <p:cNvPicPr>
+            <a:picLocks noChangeAspect="1"/>
+          </p:cNvPicPr>
+          <p:nvPr/>
+        </p:nvPicPr>
+        <p:blipFill>
+          <a:blip r:embed="rId3"/>
+          <a:stretch>
+            <a:fillRect/>
+          </a:stretch>
+        </p:blipFill>
+        <p:spPr>
+          <a:xfrm>
+            <a:off x="864037" y="5723573"/>
+            <a:ext cx="5568672" cy="744022"/>
+          </a:xfrm>
+          <a:prstGeom prst="rect">
+            <a:avLst/>
+          </a:prstGeom>
+        </p:spPr>
+      </p:pic>
+      <p:sp>
+        <p:nvSpPr>
+          <p:cNvPr id="9" name="Text 6"/>
+          <p:cNvSpPr/>
+          <p:nvPr/>
+        </p:nvSpPr>
+        <p:spPr>
+          <a:xfrm>
+            <a:off x="8018859" y="1977033"/>
+            <a:ext cx="5755124" cy="790099"/>
           </a:xfrm>
           <a:prstGeom prst="rect">
             <a:avLst/>
@@ -4558,11 +5012,12 @@
           <a:bodyPr wrap="square" rtlCol="0" anchor="t"/>
           <a:lstStyle/>
           <a:p>
-            <a:pPr marL="0" indent="0">
+            <a:pPr marL="342900" indent="-342900" algn="l">
               <a:lnSpc>
                 <a:spcPts val="3110"/>
               </a:lnSpc>
-              <a:buNone/>
+              <a:buSzPct val="100000"/>
+              <a:buChar char="•"/>
             </a:pPr>
             <a:r>
               <a:rPr lang="en-US" sz="1944" kern="0" spc="-39" dirty="0">
@@ -4573,7 +5028,7 @@
                 <a:ea typeface="Fira Sans" pitchFamily="34" charset="-122"/>
                 <a:cs typeface="Fira Sans" pitchFamily="34" charset="-120"/>
               </a:rPr>
-              <a:t>Uses a cron expression to define complex schedules, offering fine-grained control over execution timing.</a:t>
+              <a:t>The task is executed with a delay after the completion of the previous execution.</a:t>
             </a:r>
             <a:endParaRPr lang="en-US" sz="1944" dirty="0"/>
           </a:p>
@@ -4581,14 +5036,14 @@
       </p:sp>
       <p:sp>
         <p:nvSpPr>
-          <p:cNvPr id="13" name="Text 11"/>
-          <p:cNvSpPr/>
-          <p:nvPr/>
-        </p:nvSpPr>
-        <p:spPr>
-          <a:xfrm>
-            <a:off x="9710738" y="4248864"/>
-            <a:ext cx="3792260" cy="1185148"/>
+          <p:cNvPr id="10" name="Text 7"/>
+          <p:cNvSpPr/>
+          <p:nvPr/>
+        </p:nvSpPr>
+        <p:spPr>
+          <a:xfrm>
+            <a:off x="8018859" y="2853452"/>
+            <a:ext cx="5755124" cy="1580198"/>
           </a:xfrm>
           <a:prstGeom prst="rect">
             <a:avLst/>
@@ -4600,14 +5055,15 @@
           <a:bodyPr wrap="square" rtlCol="0" anchor="t"/>
           <a:lstStyle/>
           <a:p>
-            <a:pPr marL="0" indent="0">
+            <a:pPr marL="342900" indent="-342900" algn="l">
               <a:lnSpc>
                 <a:spcPts val="3110"/>
               </a:lnSpc>
-              <a:buNone/>
-            </a:pPr>
-            <a:r>
-              <a:rPr lang="en-US" sz="1944" kern="0" spc="-39" dirty="0">
+              <a:buSzPct val="100000"/>
+              <a:buChar char="•"/>
+            </a:pPr>
+            <a:r>
+              <a:rPr lang="en-US" sz="1944" b="1" kern="0" spc="-39" dirty="0">
                 <a:solidFill>
                   <a:srgbClr val="E0D6DE"/>
                 </a:solidFill>
@@ -4615,12 +5071,72 @@
                 <a:ea typeface="Fira Sans" pitchFamily="34" charset="-122"/>
                 <a:cs typeface="Fira Sans" pitchFamily="34" charset="-120"/>
               </a:rPr>
-              <a:t>@Scheduled(cron = "0 0 \* \* \* MON-FRI") - Executes every day from Monday to Friday at midnight.</a:t>
+              <a:t>Example</a:t>
+            </a:r>
+            <a:r>
+              <a:rPr lang="en-US" sz="1944" kern="0" spc="-39" dirty="0">
+                <a:solidFill>
+                  <a:srgbClr val="E0D6DE"/>
+                </a:solidFill>
+                <a:latin typeface="Fira Sans" pitchFamily="34" charset="0"/>
+                <a:ea typeface="Fira Sans" pitchFamily="34" charset="-122"/>
+                <a:cs typeface="Fira Sans" pitchFamily="34" charset="-120"/>
+              </a:rPr>
+              <a:t>: If a task is scheduled with </a:t>
+            </a:r>
+            <a:r>
+              <a:rPr lang="en-US" sz="1944" kern="0" spc="-39" dirty="0">
+                <a:solidFill>
+                  <a:srgbClr val="E0D6DE"/>
+                </a:solidFill>
+                <a:highlight>
+                  <a:srgbClr val="490315"/>
+                </a:highlight>
+                <a:latin typeface="Consolas" pitchFamily="34" charset="0"/>
+                <a:ea typeface="Consolas" pitchFamily="34" charset="-122"/>
+                <a:cs typeface="Consolas" pitchFamily="34" charset="-120"/>
+              </a:rPr>
+              <a:t>fixedDelay = 5000</a:t>
+            </a:r>
+            <a:r>
+              <a:rPr lang="en-US" sz="1944" kern="0" spc="-39" dirty="0">
+                <a:solidFill>
+                  <a:srgbClr val="E0D6DE"/>
+                </a:solidFill>
+                <a:latin typeface="Fira Sans" pitchFamily="34" charset="0"/>
+                <a:ea typeface="Fira Sans" pitchFamily="34" charset="-122"/>
+                <a:cs typeface="Fira Sans" pitchFamily="34" charset="-120"/>
+              </a:rPr>
+              <a:t> (5 seconds), it will wait 5 seconds after the previous execution completes before starting the next one.</a:t>
             </a:r>
             <a:endParaRPr lang="en-US" sz="1944" dirty="0"/>
           </a:p>
         </p:txBody>
       </p:sp>
+      <p:pic>
+        <p:nvPicPr>
+          <p:cNvPr id="11" name="Image 1" descr="preencoded.png"/>
+          <p:cNvPicPr>
+            <a:picLocks noChangeAspect="1"/>
+          </p:cNvPicPr>
+          <p:nvPr/>
+        </p:nvPicPr>
+        <p:blipFill>
+          <a:blip r:embed="rId4"/>
+          <a:stretch>
+            <a:fillRect/>
+          </a:stretch>
+        </p:blipFill>
+        <p:spPr>
+          <a:xfrm>
+            <a:off x="7623929" y="4711303"/>
+            <a:ext cx="6150054" cy="2491740"/>
+          </a:xfrm>
+          <a:prstGeom prst="rect">
+            <a:avLst/>
+          </a:prstGeom>
+        </p:spPr>
+      </p:pic>
     </p:spTree>
   </p:cSld>
   <p:clrMapOvr>
@@ -4726,8 +5242,8 @@
         </p:blipFill>
         <p:spPr>
           <a:xfrm>
-            <a:off x="9359979" y="2621637"/>
-            <a:ext cx="5054322" cy="2986326"/>
+            <a:off x="10466070" y="3150870"/>
+            <a:ext cx="2842260" cy="1927860"/>
           </a:xfrm>
           <a:prstGeom prst="rect">
             <a:avLst/>
@@ -4742,27 +5258,27 @@
         </p:nvSpPr>
         <p:spPr>
           <a:xfrm>
-            <a:off x="604837" y="1214080"/>
-            <a:ext cx="5795605" cy="540068"/>
-          </a:xfrm>
-          <a:prstGeom prst="rect">
-            <a:avLst/>
-          </a:prstGeom>
-          <a:noFill/>
-          <a:ln/>
-        </p:spPr>
-        <p:txBody>
-          <a:bodyPr wrap="none" rtlCol="0" anchor="t"/>
+            <a:off x="864037" y="1470065"/>
+            <a:ext cx="7415927" cy="1543050"/>
+          </a:xfrm>
+          <a:prstGeom prst="rect">
+            <a:avLst/>
+          </a:prstGeom>
+          <a:noFill/>
+          <a:ln/>
+        </p:spPr>
+        <p:txBody>
+          <a:bodyPr wrap="square" rtlCol="0" anchor="t"/>
           <a:lstStyle/>
           <a:p>
             <a:pPr marL="0" indent="0">
               <a:lnSpc>
-                <a:spcPts val="4253"/>
-              </a:lnSpc>
-              <a:buNone/>
-            </a:pPr>
-            <a:r>
-              <a:rPr lang="en-US" sz="3402" kern="0" spc="-34" dirty="0">
+                <a:spcPts val="6075"/>
+              </a:lnSpc>
+              <a:buNone/>
+            </a:pPr>
+            <a:r>
+              <a:rPr lang="en-US" sz="4860" kern="0" spc="-49" dirty="0">
                 <a:solidFill>
                   <a:srgbClr val="FA95AF"/>
                 </a:solidFill>
@@ -4770,44 +5286,22 @@
                 <a:ea typeface="Anton" pitchFamily="34" charset="-122"/>
                 <a:cs typeface="Anton" pitchFamily="34" charset="-120"/>
               </a:rPr>
-              <a:t>Best Practices and Considerations</a:t>
-            </a:r>
-            <a:endParaRPr lang="en-US" sz="3402" dirty="0"/>
-          </a:p>
-        </p:txBody>
-      </p:sp>
-      <p:sp>
-        <p:nvSpPr>
-          <p:cNvPr id="7" name="Shape 3"/>
-          <p:cNvSpPr/>
-          <p:nvPr/>
-        </p:nvSpPr>
-        <p:spPr>
-          <a:xfrm>
-            <a:off x="604837" y="2207657"/>
-            <a:ext cx="388739" cy="388739"/>
-          </a:xfrm>
-          <a:prstGeom prst="roundRect">
-            <a:avLst>
-              <a:gd name="adj" fmla="val 6669"/>
-            </a:avLst>
-          </a:prstGeom>
-          <a:solidFill>
-            <a:srgbClr val="3E3E3E"/>
-          </a:solidFill>
-          <a:ln/>
-        </p:spPr>
-      </p:sp>
-      <p:sp>
-        <p:nvSpPr>
-          <p:cNvPr id="8" name="Text 4"/>
-          <p:cNvSpPr/>
-          <p:nvPr/>
-        </p:nvSpPr>
-        <p:spPr>
-          <a:xfrm>
-            <a:off x="757595" y="2272427"/>
-            <a:ext cx="83106" cy="259199"/>
+              <a:t>Advanced Scheduling Techniques</a:t>
+            </a:r>
+            <a:endParaRPr lang="en-US" sz="4860" dirty="0"/>
+          </a:p>
+        </p:txBody>
+      </p:sp>
+      <p:sp>
+        <p:nvSpPr>
+          <p:cNvPr id="7" name="Text 3"/>
+          <p:cNvSpPr/>
+          <p:nvPr/>
+        </p:nvSpPr>
+        <p:spPr>
+          <a:xfrm>
+            <a:off x="864037" y="3383399"/>
+            <a:ext cx="3703320" cy="462796"/>
           </a:xfrm>
           <a:prstGeom prst="rect">
             <a:avLst/>
@@ -4819,79 +5313,37 @@
           <a:bodyPr wrap="none" rtlCol="0" anchor="t"/>
           <a:lstStyle/>
           <a:p>
-            <a:pPr marL="0" indent="0" algn="ctr">
-              <a:lnSpc>
-                <a:spcPts val="2041"/>
-              </a:lnSpc>
-              <a:buNone/>
-            </a:pPr>
-            <a:r>
-              <a:rPr lang="en-US" sz="2041" kern="0" spc="-20" dirty="0">
-                <a:solidFill>
-                  <a:srgbClr val="E0D6DE"/>
+            <a:pPr marL="0" indent="0">
+              <a:lnSpc>
+                <a:spcPts val="3645"/>
+              </a:lnSpc>
+              <a:buNone/>
+            </a:pPr>
+            <a:r>
+              <a:rPr lang="en-US" sz="2916" b="1" kern="0" spc="-29" dirty="0">
+                <a:solidFill>
+                  <a:srgbClr val="FA95AF"/>
                 </a:solidFill>
                 <a:latin typeface="Anton" pitchFamily="34" charset="0"/>
                 <a:ea typeface="Anton" pitchFamily="34" charset="-122"/>
                 <a:cs typeface="Anton" pitchFamily="34" charset="-120"/>
               </a:rPr>
-              <a:t>1</a:t>
-            </a:r>
-            <a:endParaRPr lang="en-US" sz="2041" dirty="0"/>
-          </a:p>
-        </p:txBody>
-      </p:sp>
-      <p:sp>
-        <p:nvSpPr>
-          <p:cNvPr id="9" name="Text 5"/>
-          <p:cNvSpPr/>
-          <p:nvPr/>
-        </p:nvSpPr>
-        <p:spPr>
-          <a:xfrm>
-            <a:off x="1166336" y="2207657"/>
-            <a:ext cx="2567107" cy="269915"/>
-          </a:xfrm>
-          <a:prstGeom prst="rect">
-            <a:avLst/>
-          </a:prstGeom>
-          <a:noFill/>
-          <a:ln/>
-        </p:spPr>
-        <p:txBody>
-          <a:bodyPr wrap="none" rtlCol="0" anchor="t"/>
-          <a:lstStyle/>
-          <a:p>
-            <a:pPr marL="0" indent="0">
-              <a:lnSpc>
-                <a:spcPts val="2126"/>
-              </a:lnSpc>
-              <a:buNone/>
-            </a:pPr>
-            <a:r>
-              <a:rPr lang="en-US" sz="1701" kern="0" spc="-17" dirty="0">
-                <a:solidFill>
-                  <a:srgbClr val="E0D6DE"/>
-                </a:solidFill>
-                <a:latin typeface="Anton" pitchFamily="34" charset="0"/>
-                <a:ea typeface="Anton" pitchFamily="34" charset="-122"/>
-                <a:cs typeface="Anton" pitchFamily="34" charset="-120"/>
-              </a:rPr>
-              <a:t>Managing Long-Running Tasks</a:t>
-            </a:r>
-            <a:endParaRPr lang="en-US" sz="1701" dirty="0"/>
-          </a:p>
-        </p:txBody>
-      </p:sp>
-      <p:sp>
-        <p:nvSpPr>
-          <p:cNvPr id="10" name="Text 6"/>
-          <p:cNvSpPr/>
-          <p:nvPr/>
-        </p:nvSpPr>
-        <p:spPr>
-          <a:xfrm>
-            <a:off x="1166336" y="2581156"/>
-            <a:ext cx="7372826" cy="553164"/>
+              <a:t>Using Cron Expressions</a:t>
+            </a:r>
+            <a:endParaRPr lang="en-US" sz="2916" dirty="0"/>
+          </a:p>
+        </p:txBody>
+      </p:sp>
+      <p:sp>
+        <p:nvSpPr>
+          <p:cNvPr id="8" name="Text 4"/>
+          <p:cNvSpPr/>
+          <p:nvPr/>
+        </p:nvSpPr>
+        <p:spPr>
+          <a:xfrm>
+            <a:off x="1258967" y="4216479"/>
+            <a:ext cx="7020997" cy="790099"/>
           </a:xfrm>
           <a:prstGeom prst="rect">
             <a:avLst/>
@@ -4903,14 +5355,15 @@
           <a:bodyPr wrap="square" rtlCol="0" anchor="t"/>
           <a:lstStyle/>
           <a:p>
-            <a:pPr marL="0" indent="0">
-              <a:lnSpc>
-                <a:spcPts val="2177"/>
-              </a:lnSpc>
-              <a:buNone/>
-            </a:pPr>
-            <a:r>
-              <a:rPr lang="en-US" sz="1361" kern="0" spc="-27" dirty="0">
+            <a:pPr marL="342900" indent="-342900" algn="l">
+              <a:lnSpc>
+                <a:spcPts val="3110"/>
+              </a:lnSpc>
+              <a:buSzPct val="100000"/>
+              <a:buChar char="•"/>
+            </a:pPr>
+            <a:r>
+              <a:rPr lang="en-US" sz="1944" kern="0" spc="-39" dirty="0">
                 <a:solidFill>
                   <a:srgbClr val="E0D6DE"/>
                 </a:solidFill>
@@ -4918,128 +5371,22 @@
                 <a:ea typeface="Fira Sans" pitchFamily="34" charset="-122"/>
                 <a:cs typeface="Fira Sans" pitchFamily="34" charset="-120"/>
               </a:rPr>
-              <a:t>For tasks that might take extended periods, consider using asynchronous execution mechanisms to avoid blocking the main thread and ensure application responsiveness.</a:t>
-            </a:r>
-            <a:endParaRPr lang="en-US" sz="1361" dirty="0"/>
-          </a:p>
-        </p:txBody>
-      </p:sp>
-      <p:sp>
-        <p:nvSpPr>
-          <p:cNvPr id="11" name="Shape 7"/>
-          <p:cNvSpPr/>
-          <p:nvPr/>
-        </p:nvSpPr>
-        <p:spPr>
-          <a:xfrm>
-            <a:off x="604837" y="3501390"/>
-            <a:ext cx="388739" cy="388739"/>
-          </a:xfrm>
-          <a:prstGeom prst="roundRect">
-            <a:avLst>
-              <a:gd name="adj" fmla="val 6669"/>
-            </a:avLst>
-          </a:prstGeom>
-          <a:solidFill>
-            <a:srgbClr val="3E3E3E"/>
-          </a:solidFill>
-          <a:ln/>
-        </p:spPr>
-      </p:sp>
-      <p:sp>
-        <p:nvSpPr>
-          <p:cNvPr id="12" name="Text 8"/>
-          <p:cNvSpPr/>
-          <p:nvPr/>
-        </p:nvSpPr>
-        <p:spPr>
-          <a:xfrm>
-            <a:off x="736402" y="3566160"/>
-            <a:ext cx="125492" cy="259199"/>
-          </a:xfrm>
-          <a:prstGeom prst="rect">
-            <a:avLst/>
-          </a:prstGeom>
-          <a:noFill/>
-          <a:ln/>
-        </p:spPr>
-        <p:txBody>
-          <a:bodyPr wrap="none" rtlCol="0" anchor="t"/>
-          <a:lstStyle/>
-          <a:p>
-            <a:pPr marL="0" indent="0" algn="ctr">
-              <a:lnSpc>
-                <a:spcPts val="2041"/>
-              </a:lnSpc>
-              <a:buNone/>
-            </a:pPr>
-            <a:r>
-              <a:rPr lang="en-US" sz="2041" kern="0" spc="-20" dirty="0">
-                <a:solidFill>
-                  <a:srgbClr val="E0D6DE"/>
-                </a:solidFill>
-                <a:latin typeface="Anton" pitchFamily="34" charset="0"/>
-                <a:ea typeface="Anton" pitchFamily="34" charset="-122"/>
-                <a:cs typeface="Anton" pitchFamily="34" charset="-120"/>
-              </a:rPr>
-              <a:t>2</a:t>
-            </a:r>
-            <a:endParaRPr lang="en-US" sz="2041" dirty="0"/>
-          </a:p>
-        </p:txBody>
-      </p:sp>
-      <p:sp>
-        <p:nvSpPr>
-          <p:cNvPr id="13" name="Text 9"/>
-          <p:cNvSpPr/>
-          <p:nvPr/>
-        </p:nvSpPr>
-        <p:spPr>
-          <a:xfrm>
-            <a:off x="1166336" y="3501390"/>
-            <a:ext cx="2160270" cy="269915"/>
-          </a:xfrm>
-          <a:prstGeom prst="rect">
-            <a:avLst/>
-          </a:prstGeom>
-          <a:noFill/>
-          <a:ln/>
-        </p:spPr>
-        <p:txBody>
-          <a:bodyPr wrap="none" rtlCol="0" anchor="t"/>
-          <a:lstStyle/>
-          <a:p>
-            <a:pPr marL="0" indent="0">
-              <a:lnSpc>
-                <a:spcPts val="2126"/>
-              </a:lnSpc>
-              <a:buNone/>
-            </a:pPr>
-            <a:r>
-              <a:rPr lang="en-US" sz="1701" kern="0" spc="-17" dirty="0">
-                <a:solidFill>
-                  <a:srgbClr val="E0D6DE"/>
-                </a:solidFill>
-                <a:latin typeface="Anton" pitchFamily="34" charset="0"/>
-                <a:ea typeface="Anton" pitchFamily="34" charset="-122"/>
-                <a:cs typeface="Anton" pitchFamily="34" charset="-120"/>
-              </a:rPr>
-              <a:t>Exception Handling</a:t>
-            </a:r>
-            <a:endParaRPr lang="en-US" sz="1701" dirty="0"/>
-          </a:p>
-        </p:txBody>
-      </p:sp>
-      <p:sp>
-        <p:nvSpPr>
-          <p:cNvPr id="14" name="Text 10"/>
-          <p:cNvSpPr/>
-          <p:nvPr/>
-        </p:nvSpPr>
-        <p:spPr>
-          <a:xfrm>
-            <a:off x="1166336" y="3874889"/>
-            <a:ext cx="7372826" cy="553164"/>
+              <a:t>Cron expressions are a powerful way to schedule tasks with more complex timing requirements.</a:t>
+            </a:r>
+            <a:endParaRPr lang="en-US" sz="1944" dirty="0"/>
+          </a:p>
+        </p:txBody>
+      </p:sp>
+      <p:sp>
+        <p:nvSpPr>
+          <p:cNvPr id="9" name="Text 5"/>
+          <p:cNvSpPr/>
+          <p:nvPr/>
+        </p:nvSpPr>
+        <p:spPr>
+          <a:xfrm>
+            <a:off x="1258967" y="5092898"/>
+            <a:ext cx="7020997" cy="790099"/>
           </a:xfrm>
           <a:prstGeom prst="rect">
             <a:avLst/>
@@ -5051,14 +5398,15 @@
           <a:bodyPr wrap="square" rtlCol="0" anchor="t"/>
           <a:lstStyle/>
           <a:p>
-            <a:pPr marL="0" indent="0">
-              <a:lnSpc>
-                <a:spcPts val="2177"/>
-              </a:lnSpc>
-              <a:buNone/>
-            </a:pPr>
-            <a:r>
-              <a:rPr lang="en-US" sz="1361" kern="0" spc="-27" dirty="0">
+            <a:pPr marL="342900" indent="-342900" algn="l">
+              <a:lnSpc>
+                <a:spcPts val="3110"/>
+              </a:lnSpc>
+              <a:buSzPct val="100000"/>
+              <a:buChar char="•"/>
+            </a:pPr>
+            <a:r>
+              <a:rPr lang="en-US" sz="1944" kern="0" spc="-39" dirty="0">
                 <a:solidFill>
                   <a:srgbClr val="E0D6DE"/>
                 </a:solidFill>
@@ -5066,128 +5414,22 @@
                 <a:ea typeface="Fira Sans" pitchFamily="34" charset="-122"/>
                 <a:cs typeface="Fira Sans" pitchFamily="34" charset="-120"/>
               </a:rPr>
-              <a:t>Implement robust exception handling mechanisms to gracefully manage errors during task execution, preventing application crashes and ensuring stability.</a:t>
-            </a:r>
-            <a:endParaRPr lang="en-US" sz="1361" dirty="0"/>
-          </a:p>
-        </p:txBody>
-      </p:sp>
-      <p:sp>
-        <p:nvSpPr>
-          <p:cNvPr id="15" name="Shape 11"/>
-          <p:cNvSpPr/>
-          <p:nvPr/>
-        </p:nvSpPr>
-        <p:spPr>
-          <a:xfrm>
-            <a:off x="604837" y="4795123"/>
-            <a:ext cx="388739" cy="388739"/>
-          </a:xfrm>
-          <a:prstGeom prst="roundRect">
-            <a:avLst>
-              <a:gd name="adj" fmla="val 6669"/>
-            </a:avLst>
-          </a:prstGeom>
-          <a:solidFill>
-            <a:srgbClr val="3E3E3E"/>
-          </a:solidFill>
-          <a:ln/>
-        </p:spPr>
-      </p:sp>
-      <p:sp>
-        <p:nvSpPr>
-          <p:cNvPr id="16" name="Text 12"/>
-          <p:cNvSpPr/>
-          <p:nvPr/>
-        </p:nvSpPr>
-        <p:spPr>
-          <a:xfrm>
-            <a:off x="736402" y="4859893"/>
-            <a:ext cx="125492" cy="259199"/>
-          </a:xfrm>
-          <a:prstGeom prst="rect">
-            <a:avLst/>
-          </a:prstGeom>
-          <a:noFill/>
-          <a:ln/>
-        </p:spPr>
-        <p:txBody>
-          <a:bodyPr wrap="none" rtlCol="0" anchor="t"/>
-          <a:lstStyle/>
-          <a:p>
-            <a:pPr marL="0" indent="0" algn="ctr">
-              <a:lnSpc>
-                <a:spcPts val="2041"/>
-              </a:lnSpc>
-              <a:buNone/>
-            </a:pPr>
-            <a:r>
-              <a:rPr lang="en-US" sz="2041" kern="0" spc="-20" dirty="0">
-                <a:solidFill>
-                  <a:srgbClr val="E0D6DE"/>
-                </a:solidFill>
-                <a:latin typeface="Anton" pitchFamily="34" charset="0"/>
-                <a:ea typeface="Anton" pitchFamily="34" charset="-122"/>
-                <a:cs typeface="Anton" pitchFamily="34" charset="-120"/>
-              </a:rPr>
-              <a:t>3</a:t>
-            </a:r>
-            <a:endParaRPr lang="en-US" sz="2041" dirty="0"/>
-          </a:p>
-        </p:txBody>
-      </p:sp>
-      <p:sp>
-        <p:nvSpPr>
-          <p:cNvPr id="17" name="Text 13"/>
-          <p:cNvSpPr/>
-          <p:nvPr/>
-        </p:nvSpPr>
-        <p:spPr>
-          <a:xfrm>
-            <a:off x="1166336" y="4795123"/>
-            <a:ext cx="2238732" cy="269915"/>
-          </a:xfrm>
-          <a:prstGeom prst="rect">
-            <a:avLst/>
-          </a:prstGeom>
-          <a:noFill/>
-          <a:ln/>
-        </p:spPr>
-        <p:txBody>
-          <a:bodyPr wrap="none" rtlCol="0" anchor="t"/>
-          <a:lstStyle/>
-          <a:p>
-            <a:pPr marL="0" indent="0">
-              <a:lnSpc>
-                <a:spcPts val="2126"/>
-              </a:lnSpc>
-              <a:buNone/>
-            </a:pPr>
-            <a:r>
-              <a:rPr lang="en-US" sz="1701" kern="0" spc="-17" dirty="0">
-                <a:solidFill>
-                  <a:srgbClr val="E0D6DE"/>
-                </a:solidFill>
-                <a:latin typeface="Anton" pitchFamily="34" charset="0"/>
-                <a:ea typeface="Anton" pitchFamily="34" charset="-122"/>
-                <a:cs typeface="Anton" pitchFamily="34" charset="-120"/>
-              </a:rPr>
-              <a:t>Avoiding Heavy Operations</a:t>
-            </a:r>
-            <a:endParaRPr lang="en-US" sz="1701" dirty="0"/>
-          </a:p>
-        </p:txBody>
-      </p:sp>
-      <p:sp>
-        <p:nvSpPr>
-          <p:cNvPr id="18" name="Text 14"/>
-          <p:cNvSpPr/>
-          <p:nvPr/>
-        </p:nvSpPr>
-        <p:spPr>
-          <a:xfrm>
-            <a:off x="1166336" y="5168622"/>
-            <a:ext cx="7372826" cy="553164"/>
+              <a:t>They allow you to specify a specific time, date, or recurring pattern for task execution.</a:t>
+            </a:r>
+            <a:endParaRPr lang="en-US" sz="1944" dirty="0"/>
+          </a:p>
+        </p:txBody>
+      </p:sp>
+      <p:sp>
+        <p:nvSpPr>
+          <p:cNvPr id="10" name="Text 6"/>
+          <p:cNvSpPr/>
+          <p:nvPr/>
+        </p:nvSpPr>
+        <p:spPr>
+          <a:xfrm>
+            <a:off x="1258967" y="5969318"/>
+            <a:ext cx="7020997" cy="790099"/>
           </a:xfrm>
           <a:prstGeom prst="rect">
             <a:avLst/>
@@ -5199,14 +5441,15 @@
           <a:bodyPr wrap="square" rtlCol="0" anchor="t"/>
           <a:lstStyle/>
           <a:p>
-            <a:pPr marL="0" indent="0">
-              <a:lnSpc>
-                <a:spcPts val="2177"/>
-              </a:lnSpc>
-              <a:buNone/>
-            </a:pPr>
-            <a:r>
-              <a:rPr lang="en-US" sz="1361" kern="0" spc="-27" dirty="0">
+            <a:pPr marL="342900" indent="-342900" algn="l">
+              <a:lnSpc>
+                <a:spcPts val="3110"/>
+              </a:lnSpc>
+              <a:buSzPct val="100000"/>
+              <a:buChar char="•"/>
+            </a:pPr>
+            <a:r>
+              <a:rPr lang="en-US" sz="1944" kern="0" spc="-39" dirty="0">
                 <a:solidFill>
                   <a:srgbClr val="E0D6DE"/>
                 </a:solidFill>
@@ -5214,157 +5457,9 @@
                 <a:ea typeface="Fira Sans" pitchFamily="34" charset="-122"/>
                 <a:cs typeface="Fira Sans" pitchFamily="34" charset="-120"/>
               </a:rPr>
-              <a:t>Minimize heavy operations on the main thread to prevent performance degradation. Offload intensive tasks to background threads or dedicated worker processes.</a:t>
-            </a:r>
-            <a:endParaRPr lang="en-US" sz="1361" dirty="0"/>
-          </a:p>
-        </p:txBody>
-      </p:sp>
-      <p:sp>
-        <p:nvSpPr>
-          <p:cNvPr id="19" name="Shape 15"/>
-          <p:cNvSpPr/>
-          <p:nvPr/>
-        </p:nvSpPr>
-        <p:spPr>
-          <a:xfrm>
-            <a:off x="604837" y="6088856"/>
-            <a:ext cx="388739" cy="388739"/>
-          </a:xfrm>
-          <a:prstGeom prst="roundRect">
-            <a:avLst>
-              <a:gd name="adj" fmla="val 6669"/>
-            </a:avLst>
-          </a:prstGeom>
-          <a:solidFill>
-            <a:srgbClr val="3E3E3E"/>
-          </a:solidFill>
-          <a:ln/>
-        </p:spPr>
-      </p:sp>
-      <p:sp>
-        <p:nvSpPr>
-          <p:cNvPr id="20" name="Text 16"/>
-          <p:cNvSpPr/>
-          <p:nvPr/>
-        </p:nvSpPr>
-        <p:spPr>
-          <a:xfrm>
-            <a:off x="736402" y="6153626"/>
-            <a:ext cx="125492" cy="259199"/>
-          </a:xfrm>
-          <a:prstGeom prst="rect">
-            <a:avLst/>
-          </a:prstGeom>
-          <a:noFill/>
-          <a:ln/>
-        </p:spPr>
-        <p:txBody>
-          <a:bodyPr wrap="none" rtlCol="0" anchor="t"/>
-          <a:lstStyle/>
-          <a:p>
-            <a:pPr marL="0" indent="0" algn="ctr">
-              <a:lnSpc>
-                <a:spcPts val="2041"/>
-              </a:lnSpc>
-              <a:buNone/>
-            </a:pPr>
-            <a:r>
-              <a:rPr lang="en-US" sz="2041" kern="0" spc="-20" dirty="0">
-                <a:solidFill>
-                  <a:srgbClr val="E0D6DE"/>
-                </a:solidFill>
-                <a:latin typeface="Anton" pitchFamily="34" charset="0"/>
-                <a:ea typeface="Anton" pitchFamily="34" charset="-122"/>
-                <a:cs typeface="Anton" pitchFamily="34" charset="-120"/>
-              </a:rPr>
-              <a:t>4</a:t>
-            </a:r>
-            <a:endParaRPr lang="en-US" sz="2041" dirty="0"/>
-          </a:p>
-        </p:txBody>
-      </p:sp>
-      <p:sp>
-        <p:nvSpPr>
-          <p:cNvPr id="21" name="Text 17"/>
-          <p:cNvSpPr/>
-          <p:nvPr/>
-        </p:nvSpPr>
-        <p:spPr>
-          <a:xfrm>
-            <a:off x="1166336" y="6088856"/>
-            <a:ext cx="2160270" cy="269915"/>
-          </a:xfrm>
-          <a:prstGeom prst="rect">
-            <a:avLst/>
-          </a:prstGeom>
-          <a:noFill/>
-          <a:ln/>
-        </p:spPr>
-        <p:txBody>
-          <a:bodyPr wrap="none" rtlCol="0" anchor="t"/>
-          <a:lstStyle/>
-          <a:p>
-            <a:pPr marL="0" indent="0">
-              <a:lnSpc>
-                <a:spcPts val="2126"/>
-              </a:lnSpc>
-              <a:buNone/>
-            </a:pPr>
-            <a:r>
-              <a:rPr lang="en-US" sz="1701" kern="0" spc="-17" dirty="0">
-                <a:solidFill>
-                  <a:srgbClr val="E0D6DE"/>
-                </a:solidFill>
-                <a:latin typeface="Anton" pitchFamily="34" charset="0"/>
-                <a:ea typeface="Anton" pitchFamily="34" charset="-122"/>
-                <a:cs typeface="Anton" pitchFamily="34" charset="-120"/>
-              </a:rPr>
-              <a:t>Performance Impact</a:t>
-            </a:r>
-            <a:endParaRPr lang="en-US" sz="1701" dirty="0"/>
-          </a:p>
-        </p:txBody>
-      </p:sp>
-      <p:sp>
-        <p:nvSpPr>
-          <p:cNvPr id="22" name="Text 18"/>
-          <p:cNvSpPr/>
-          <p:nvPr/>
-        </p:nvSpPr>
-        <p:spPr>
-          <a:xfrm>
-            <a:off x="1166336" y="6462355"/>
-            <a:ext cx="7372826" cy="553164"/>
-          </a:xfrm>
-          <a:prstGeom prst="rect">
-            <a:avLst/>
-          </a:prstGeom>
-          <a:noFill/>
-          <a:ln/>
-        </p:spPr>
-        <p:txBody>
-          <a:bodyPr wrap="square" rtlCol="0" anchor="t"/>
-          <a:lstStyle/>
-          <a:p>
-            <a:pPr marL="0" indent="0">
-              <a:lnSpc>
-                <a:spcPts val="2177"/>
-              </a:lnSpc>
-              <a:buNone/>
-            </a:pPr>
-            <a:r>
-              <a:rPr lang="en-US" sz="1361" kern="0" spc="-27" dirty="0">
-                <a:solidFill>
-                  <a:srgbClr val="E0D6DE"/>
-                </a:solidFill>
-                <a:latin typeface="Fira Sans" pitchFamily="34" charset="0"/>
-                <a:ea typeface="Fira Sans" pitchFamily="34" charset="-122"/>
-                <a:cs typeface="Fira Sans" pitchFamily="34" charset="-120"/>
-              </a:rPr>
-              <a:t>Carefully consider the impact of scheduling on application performance. Optimize tasks and schedules to minimize resource consumption and ensure optimal throughput.</a:t>
-            </a:r>
-            <a:endParaRPr lang="en-US" sz="1361" dirty="0"/>
+              <a:t>This can be useful for scheduling tasks at specific intervals, on certain days of the week, or even at specific times of the day.</a:t>
+            </a:r>
+            <a:endParaRPr lang="en-US" sz="1944" dirty="0"/>
           </a:p>
         </p:txBody>
       </p:sp>
@@ -5433,51 +5528,9 @@
           <a:ln/>
         </p:spPr>
       </p:sp>
-      <p:sp>
-        <p:nvSpPr>
-          <p:cNvPr id="4" name="Text 2"/>
-          <p:cNvSpPr/>
-          <p:nvPr/>
-        </p:nvSpPr>
-        <p:spPr>
-          <a:xfrm>
-            <a:off x="864037" y="1857256"/>
-            <a:ext cx="6172200" cy="771525"/>
-          </a:xfrm>
-          <a:prstGeom prst="rect">
-            <a:avLst/>
-          </a:prstGeom>
-          <a:noFill/>
-          <a:ln/>
-        </p:spPr>
-        <p:txBody>
-          <a:bodyPr wrap="none" rtlCol="0" anchor="t"/>
-          <a:lstStyle/>
-          <a:p>
-            <a:pPr marL="0" indent="0">
-              <a:lnSpc>
-                <a:spcPts val="6075"/>
-              </a:lnSpc>
-              <a:buNone/>
-            </a:pPr>
-            <a:r>
-              <a:rPr lang="en-US" sz="4860" kern="0" spc="-49" dirty="0">
-                <a:solidFill>
-                  <a:srgbClr val="FA95AF"/>
-                </a:solidFill>
-                <a:latin typeface="Anton" pitchFamily="34" charset="0"/>
-                <a:ea typeface="Anton" pitchFamily="34" charset="-122"/>
-                <a:cs typeface="Anton" pitchFamily="34" charset="-120"/>
-              </a:rPr>
-              <a:t>Conclusion</a:t>
-            </a:r>
-            <a:endParaRPr lang="en-US" sz="4860" dirty="0"/>
-          </a:p>
-        </p:txBody>
-      </p:sp>
       <p:pic>
         <p:nvPicPr>
-          <p:cNvPr id="5" name="Image 0" descr="preencoded.png"/>
+          <p:cNvPr id="4" name="Image 0" descr="preencoded.png"/>
           <p:cNvPicPr>
             <a:picLocks noChangeAspect="1"/>
           </p:cNvPicPr>
@@ -5491,101 +5544,17 @@
         </p:blipFill>
         <p:spPr>
           <a:xfrm>
-            <a:off x="864037" y="2999065"/>
-            <a:ext cx="617220" cy="617220"/>
+            <a:off x="9144000" y="0"/>
+            <a:ext cx="5486400" cy="8229600"/>
           </a:xfrm>
           <a:prstGeom prst="rect">
             <a:avLst/>
           </a:prstGeom>
         </p:spPr>
       </p:pic>
-      <p:sp>
-        <p:nvSpPr>
-          <p:cNvPr id="6" name="Text 3"/>
-          <p:cNvSpPr/>
-          <p:nvPr/>
-        </p:nvSpPr>
-        <p:spPr>
-          <a:xfrm>
-            <a:off x="864037" y="3863102"/>
-            <a:ext cx="3135154" cy="385763"/>
-          </a:xfrm>
-          <a:prstGeom prst="rect">
-            <a:avLst/>
-          </a:prstGeom>
-          <a:noFill/>
-          <a:ln/>
-        </p:spPr>
-        <p:txBody>
-          <a:bodyPr wrap="none" rtlCol="0" anchor="t"/>
-          <a:lstStyle/>
-          <a:p>
-            <a:pPr marL="0" indent="0" algn="l">
-              <a:lnSpc>
-                <a:spcPts val="3038"/>
-              </a:lnSpc>
-              <a:buNone/>
-            </a:pPr>
-            <a:r>
-              <a:rPr lang="en-US" sz="2430" kern="0" spc="-24" dirty="0">
-                <a:solidFill>
-                  <a:srgbClr val="E0D6DE"/>
-                </a:solidFill>
-                <a:latin typeface="Anton" pitchFamily="34" charset="0"/>
-                <a:ea typeface="Anton" pitchFamily="34" charset="-122"/>
-                <a:cs typeface="Anton" pitchFamily="34" charset="-120"/>
-              </a:rPr>
-              <a:t>Automation and Efficiency</a:t>
-            </a:r>
-            <a:endParaRPr lang="en-US" sz="2430" dirty="0"/>
-          </a:p>
-        </p:txBody>
-      </p:sp>
-      <p:sp>
-        <p:nvSpPr>
-          <p:cNvPr id="7" name="Text 4"/>
-          <p:cNvSpPr/>
-          <p:nvPr/>
-        </p:nvSpPr>
-        <p:spPr>
-          <a:xfrm>
-            <a:off x="864037" y="4396978"/>
-            <a:ext cx="4053840" cy="1580198"/>
-          </a:xfrm>
-          <a:prstGeom prst="rect">
-            <a:avLst/>
-          </a:prstGeom>
-          <a:noFill/>
-          <a:ln/>
-        </p:spPr>
-        <p:txBody>
-          <a:bodyPr wrap="square" rtlCol="0" anchor="t"/>
-          <a:lstStyle/>
-          <a:p>
-            <a:pPr marL="0" indent="0" algn="l">
-              <a:lnSpc>
-                <a:spcPts val="3110"/>
-              </a:lnSpc>
-              <a:buNone/>
-            </a:pPr>
-            <a:r>
-              <a:rPr lang="en-US" sz="1944" kern="0" spc="-39" dirty="0">
-                <a:solidFill>
-                  <a:srgbClr val="E0D6DE"/>
-                </a:solidFill>
-                <a:latin typeface="Fira Sans" pitchFamily="34" charset="0"/>
-                <a:ea typeface="Fira Sans" pitchFamily="34" charset="-122"/>
-                <a:cs typeface="Fira Sans" pitchFamily="34" charset="-120"/>
-              </a:rPr>
-              <a:t>Schedulers play a crucial role in automating repetitive tasks, enhancing application efficiency, and streamlining workflows.</a:t>
-            </a:r>
-            <a:endParaRPr lang="en-US" sz="1944" dirty="0"/>
-          </a:p>
-        </p:txBody>
-      </p:sp>
       <p:pic>
         <p:nvPicPr>
-          <p:cNvPr id="8" name="Image 1" descr="preencoded.png"/>
+          <p:cNvPr id="5" name="Image 1" descr="preencoded.png"/>
           <p:cNvPicPr>
             <a:picLocks noChangeAspect="1"/>
           </p:cNvPicPr>
@@ -5599,8 +5568,8 @@
         </p:blipFill>
         <p:spPr>
           <a:xfrm>
-            <a:off x="5288161" y="2999065"/>
-            <a:ext cx="617220" cy="617220"/>
+            <a:off x="9359979" y="2621637"/>
+            <a:ext cx="5054322" cy="2986326"/>
           </a:xfrm>
           <a:prstGeom prst="rect">
             <a:avLst/>
@@ -5609,14 +5578,14 @@
       </p:pic>
       <p:sp>
         <p:nvSpPr>
-          <p:cNvPr id="9" name="Text 5"/>
-          <p:cNvSpPr/>
-          <p:nvPr/>
-        </p:nvSpPr>
-        <p:spPr>
-          <a:xfrm>
-            <a:off x="5288161" y="3863102"/>
-            <a:ext cx="3086100" cy="385763"/>
+          <p:cNvPr id="6" name="Text 2"/>
+          <p:cNvSpPr/>
+          <p:nvPr/>
+        </p:nvSpPr>
+        <p:spPr>
+          <a:xfrm>
+            <a:off x="604837" y="1214080"/>
+            <a:ext cx="5795605" cy="540068"/>
           </a:xfrm>
           <a:prstGeom prst="rect">
             <a:avLst/>
@@ -5628,24 +5597,130 @@
           <a:bodyPr wrap="none" rtlCol="0" anchor="t"/>
           <a:lstStyle/>
           <a:p>
-            <a:pPr marL="0" indent="0" algn="l">
-              <a:lnSpc>
-                <a:spcPts val="3038"/>
-              </a:lnSpc>
-              <a:buNone/>
-            </a:pPr>
-            <a:r>
-              <a:rPr lang="en-US" sz="2430" kern="0" spc="-24" dirty="0">
-                <a:solidFill>
-                  <a:srgbClr val="E0D6DE"/>
+            <a:pPr marL="0" indent="0">
+              <a:lnSpc>
+                <a:spcPts val="4253"/>
+              </a:lnSpc>
+              <a:buNone/>
+            </a:pPr>
+            <a:r>
+              <a:rPr lang="en-US" sz="3402" kern="0" spc="-34" dirty="0">
+                <a:solidFill>
+                  <a:srgbClr val="FA95AF"/>
                 </a:solidFill>
                 <a:latin typeface="Anton" pitchFamily="34" charset="0"/>
                 <a:ea typeface="Anton" pitchFamily="34" charset="-122"/>
                 <a:cs typeface="Anton" pitchFamily="34" charset="-120"/>
               </a:rPr>
-              <a:t>Spring Boot Integration</a:t>
-            </a:r>
-            <a:endParaRPr lang="en-US" sz="2430" dirty="0"/>
+              <a:t>Best Practices and Considerations</a:t>
+            </a:r>
+            <a:endParaRPr lang="en-US" sz="3402" dirty="0"/>
+          </a:p>
+        </p:txBody>
+      </p:sp>
+      <p:sp>
+        <p:nvSpPr>
+          <p:cNvPr id="7" name="Shape 3"/>
+          <p:cNvSpPr/>
+          <p:nvPr/>
+        </p:nvSpPr>
+        <p:spPr>
+          <a:xfrm>
+            <a:off x="604837" y="2207657"/>
+            <a:ext cx="388739" cy="388739"/>
+          </a:xfrm>
+          <a:prstGeom prst="roundRect">
+            <a:avLst>
+              <a:gd name="adj" fmla="val 6669"/>
+            </a:avLst>
+          </a:prstGeom>
+          <a:solidFill>
+            <a:srgbClr val="3E3E3E"/>
+          </a:solidFill>
+          <a:ln/>
+        </p:spPr>
+      </p:sp>
+      <p:sp>
+        <p:nvSpPr>
+          <p:cNvPr id="8" name="Text 4"/>
+          <p:cNvSpPr/>
+          <p:nvPr/>
+        </p:nvSpPr>
+        <p:spPr>
+          <a:xfrm>
+            <a:off x="757595" y="2272427"/>
+            <a:ext cx="83106" cy="259199"/>
+          </a:xfrm>
+          <a:prstGeom prst="rect">
+            <a:avLst/>
+          </a:prstGeom>
+          <a:noFill/>
+          <a:ln/>
+        </p:spPr>
+        <p:txBody>
+          <a:bodyPr wrap="none" rtlCol="0" anchor="t"/>
+          <a:lstStyle/>
+          <a:p>
+            <a:pPr marL="0" indent="0" algn="ctr">
+              <a:lnSpc>
+                <a:spcPts val="2041"/>
+              </a:lnSpc>
+              <a:buNone/>
+            </a:pPr>
+            <a:r>
+              <a:rPr lang="en-US" sz="2041" kern="0" spc="-20" dirty="0">
+                <a:solidFill>
+                  <a:srgbClr val="E0D6DE"/>
+                </a:solidFill>
+                <a:latin typeface="Anton" pitchFamily="34" charset="0"/>
+                <a:ea typeface="Anton" pitchFamily="34" charset="-122"/>
+                <a:cs typeface="Anton" pitchFamily="34" charset="-120"/>
+              </a:rPr>
+              <a:t>1</a:t>
+            </a:r>
+            <a:endParaRPr lang="en-US" sz="2041" dirty="0"/>
+          </a:p>
+        </p:txBody>
+      </p:sp>
+      <p:sp>
+        <p:nvSpPr>
+          <p:cNvPr id="9" name="Text 5"/>
+          <p:cNvSpPr/>
+          <p:nvPr/>
+        </p:nvSpPr>
+        <p:spPr>
+          <a:xfrm>
+            <a:off x="1166336" y="2207657"/>
+            <a:ext cx="2567107" cy="269915"/>
+          </a:xfrm>
+          <a:prstGeom prst="rect">
+            <a:avLst/>
+          </a:prstGeom>
+          <a:noFill/>
+          <a:ln/>
+        </p:spPr>
+        <p:txBody>
+          <a:bodyPr wrap="none" rtlCol="0" anchor="t"/>
+          <a:lstStyle/>
+          <a:p>
+            <a:pPr marL="0" indent="0">
+              <a:lnSpc>
+                <a:spcPts val="2126"/>
+              </a:lnSpc>
+              <a:buNone/>
+            </a:pPr>
+            <a:r>
+              <a:rPr lang="en-US" sz="1701" kern="0" spc="-17" dirty="0">
+                <a:solidFill>
+                  <a:srgbClr val="E0D6DE"/>
+                </a:solidFill>
+                <a:latin typeface="Anton" pitchFamily="34" charset="0"/>
+                <a:ea typeface="Anton" pitchFamily="34" charset="-122"/>
+                <a:cs typeface="Anton" pitchFamily="34" charset="-120"/>
+              </a:rPr>
+              <a:t>Managing Long-Running Tasks</a:t>
+            </a:r>
+            <a:endParaRPr lang="en-US" sz="1701" dirty="0"/>
           </a:p>
         </p:txBody>
       </p:sp>
@@ -5657,8 +5732,8 @@
         </p:nvSpPr>
         <p:spPr>
           <a:xfrm>
-            <a:off x="5288161" y="4396978"/>
-            <a:ext cx="4053959" cy="1580198"/>
+            <a:off x="1166336" y="2581156"/>
+            <a:ext cx="7372826" cy="553164"/>
           </a:xfrm>
           <a:prstGeom prst="rect">
             <a:avLst/>
@@ -5670,14 +5745,14 @@
           <a:bodyPr wrap="square" rtlCol="0" anchor="t"/>
           <a:lstStyle/>
           <a:p>
-            <a:pPr marL="0" indent="0" algn="l">
-              <a:lnSpc>
-                <a:spcPts val="3110"/>
-              </a:lnSpc>
-              <a:buNone/>
-            </a:pPr>
-            <a:r>
-              <a:rPr lang="en-US" sz="1944" kern="0" spc="-39" dirty="0">
+            <a:pPr marL="0" indent="0">
+              <a:lnSpc>
+                <a:spcPts val="2177"/>
+              </a:lnSpc>
+              <a:buNone/>
+            </a:pPr>
+            <a:r>
+              <a:rPr lang="en-US" sz="1361" kern="0" spc="-27" dirty="0">
                 <a:solidFill>
                   <a:srgbClr val="E0D6DE"/>
                 </a:solidFill>
@@ -5685,46 +5760,44 @@
                 <a:ea typeface="Fira Sans" pitchFamily="34" charset="-122"/>
                 <a:cs typeface="Fira Sans" pitchFamily="34" charset="-120"/>
               </a:rPr>
-              <a:t>Spring Boot provides a robust and convenient framework for integrating scheduling mechanisms into your applications.</a:t>
-            </a:r>
-            <a:endParaRPr lang="en-US" sz="1944" dirty="0"/>
-          </a:p>
-        </p:txBody>
-      </p:sp>
-      <p:pic>
-        <p:nvPicPr>
-          <p:cNvPr id="11" name="Image 2" descr="preencoded.png"/>
-          <p:cNvPicPr>
-            <a:picLocks noChangeAspect="1"/>
-          </p:cNvPicPr>
-          <p:nvPr/>
-        </p:nvPicPr>
-        <p:blipFill>
-          <a:blip r:embed="rId5"/>
-          <a:stretch>
-            <a:fillRect/>
-          </a:stretch>
-        </p:blipFill>
-        <p:spPr>
-          <a:xfrm>
-            <a:off x="9712404" y="2999065"/>
-            <a:ext cx="617220" cy="617220"/>
-          </a:xfrm>
-          <a:prstGeom prst="rect">
-            <a:avLst/>
-          </a:prstGeom>
-        </p:spPr>
-      </p:pic>
-      <p:sp>
-        <p:nvSpPr>
-          <p:cNvPr id="12" name="Text 7"/>
-          <p:cNvSpPr/>
-          <p:nvPr/>
-        </p:nvSpPr>
-        <p:spPr>
-          <a:xfrm>
-            <a:off x="9712404" y="3863102"/>
-            <a:ext cx="3666530" cy="385763"/>
+              <a:t>For tasks that might take extended periods, consider using asynchronous execution mechanisms to avoid blocking the main thread and ensure application responsiveness.</a:t>
+            </a:r>
+            <a:endParaRPr lang="en-US" sz="1361" dirty="0"/>
+          </a:p>
+        </p:txBody>
+      </p:sp>
+      <p:sp>
+        <p:nvSpPr>
+          <p:cNvPr id="11" name="Shape 7"/>
+          <p:cNvSpPr/>
+          <p:nvPr/>
+        </p:nvSpPr>
+        <p:spPr>
+          <a:xfrm>
+            <a:off x="604837" y="3501390"/>
+            <a:ext cx="388739" cy="388739"/>
+          </a:xfrm>
+          <a:prstGeom prst="roundRect">
+            <a:avLst>
+              <a:gd name="adj" fmla="val 6669"/>
+            </a:avLst>
+          </a:prstGeom>
+          <a:solidFill>
+            <a:srgbClr val="3E3E3E"/>
+          </a:solidFill>
+          <a:ln/>
+        </p:spPr>
+      </p:sp>
+      <p:sp>
+        <p:nvSpPr>
+          <p:cNvPr id="12" name="Text 8"/>
+          <p:cNvSpPr/>
+          <p:nvPr/>
+        </p:nvSpPr>
+        <p:spPr>
+          <a:xfrm>
+            <a:off x="736402" y="3566160"/>
+            <a:ext cx="125492" cy="259199"/>
           </a:xfrm>
           <a:prstGeom prst="rect">
             <a:avLst/>
@@ -5736,14 +5809,14 @@
           <a:bodyPr wrap="none" rtlCol="0" anchor="t"/>
           <a:lstStyle/>
           <a:p>
-            <a:pPr marL="0" indent="0" algn="l">
-              <a:lnSpc>
-                <a:spcPts val="3038"/>
-              </a:lnSpc>
-              <a:buNone/>
-            </a:pPr>
-            <a:r>
-              <a:rPr lang="en-US" sz="2430" kern="0" spc="-24" dirty="0">
+            <a:pPr marL="0" indent="0" algn="ctr">
+              <a:lnSpc>
+                <a:spcPts val="2041"/>
+              </a:lnSpc>
+              <a:buNone/>
+            </a:pPr>
+            <a:r>
+              <a:rPr lang="en-US" sz="2041" kern="0" spc="-20" dirty="0">
                 <a:solidFill>
                   <a:srgbClr val="E0D6DE"/>
                 </a:solidFill>
@@ -5751,22 +5824,64 @@
                 <a:ea typeface="Anton" pitchFamily="34" charset="-122"/>
                 <a:cs typeface="Anton" pitchFamily="34" charset="-120"/>
               </a:rPr>
-              <a:t>Sample Project Demonstration</a:t>
-            </a:r>
-            <a:endParaRPr lang="en-US" sz="2430" dirty="0"/>
-          </a:p>
-        </p:txBody>
-      </p:sp>
-      <p:sp>
-        <p:nvSpPr>
-          <p:cNvPr id="13" name="Text 8"/>
-          <p:cNvSpPr/>
-          <p:nvPr/>
-        </p:nvSpPr>
-        <p:spPr>
-          <a:xfrm>
-            <a:off x="9712404" y="4396978"/>
-            <a:ext cx="4053840" cy="1975247"/>
+              <a:t>2</a:t>
+            </a:r>
+            <a:endParaRPr lang="en-US" sz="2041" dirty="0"/>
+          </a:p>
+        </p:txBody>
+      </p:sp>
+      <p:sp>
+        <p:nvSpPr>
+          <p:cNvPr id="13" name="Text 9"/>
+          <p:cNvSpPr/>
+          <p:nvPr/>
+        </p:nvSpPr>
+        <p:spPr>
+          <a:xfrm>
+            <a:off x="1166336" y="3501390"/>
+            <a:ext cx="2160270" cy="269915"/>
+          </a:xfrm>
+          <a:prstGeom prst="rect">
+            <a:avLst/>
+          </a:prstGeom>
+          <a:noFill/>
+          <a:ln/>
+        </p:spPr>
+        <p:txBody>
+          <a:bodyPr wrap="none" rtlCol="0" anchor="t"/>
+          <a:lstStyle/>
+          <a:p>
+            <a:pPr marL="0" indent="0">
+              <a:lnSpc>
+                <a:spcPts val="2126"/>
+              </a:lnSpc>
+              <a:buNone/>
+            </a:pPr>
+            <a:r>
+              <a:rPr lang="en-US" sz="1701" kern="0" spc="-17" dirty="0">
+                <a:solidFill>
+                  <a:srgbClr val="E0D6DE"/>
+                </a:solidFill>
+                <a:latin typeface="Anton" pitchFamily="34" charset="0"/>
+                <a:ea typeface="Anton" pitchFamily="34" charset="-122"/>
+                <a:cs typeface="Anton" pitchFamily="34" charset="-120"/>
+              </a:rPr>
+              <a:t>Exception Handling</a:t>
+            </a:r>
+            <a:endParaRPr lang="en-US" sz="1701" dirty="0"/>
+          </a:p>
+        </p:txBody>
+      </p:sp>
+      <p:sp>
+        <p:nvSpPr>
+          <p:cNvPr id="14" name="Text 10"/>
+          <p:cNvSpPr/>
+          <p:nvPr/>
+        </p:nvSpPr>
+        <p:spPr>
+          <a:xfrm>
+            <a:off x="1166336" y="3874889"/>
+            <a:ext cx="7372826" cy="553164"/>
           </a:xfrm>
           <a:prstGeom prst="rect">
             <a:avLst/>
@@ -5778,14 +5893,14 @@
           <a:bodyPr wrap="square" rtlCol="0" anchor="t"/>
           <a:lstStyle/>
           <a:p>
-            <a:pPr marL="0" indent="0" algn="l">
-              <a:lnSpc>
-                <a:spcPts val="3110"/>
-              </a:lnSpc>
-              <a:buNone/>
-            </a:pPr>
-            <a:r>
-              <a:rPr lang="en-US" sz="1944" kern="0" spc="-39" dirty="0">
+            <a:pPr marL="0" indent="0">
+              <a:lnSpc>
+                <a:spcPts val="2177"/>
+              </a:lnSpc>
+              <a:buNone/>
+            </a:pPr>
+            <a:r>
+              <a:rPr lang="en-US" sz="1361" kern="0" spc="-27" dirty="0">
                 <a:solidFill>
                   <a:srgbClr val="E0D6DE"/>
                 </a:solidFill>
@@ -5793,9 +5908,305 @@
                 <a:ea typeface="Fira Sans" pitchFamily="34" charset="-122"/>
                 <a:cs typeface="Fira Sans" pitchFamily="34" charset="-120"/>
               </a:rPr>
-              <a:t>The sample project showcased the practical application of scheduling concepts, providing a hands-on understanding of how to implement scheduled tasks.</a:t>
-            </a:r>
-            <a:endParaRPr lang="en-US" sz="1944" dirty="0"/>
+              <a:t>Implement robust exception handling mechanisms to gracefully manage errors during task execution, preventing application crashes and ensuring stability.</a:t>
+            </a:r>
+            <a:endParaRPr lang="en-US" sz="1361" dirty="0"/>
+          </a:p>
+        </p:txBody>
+      </p:sp>
+      <p:sp>
+        <p:nvSpPr>
+          <p:cNvPr id="15" name="Shape 11"/>
+          <p:cNvSpPr/>
+          <p:nvPr/>
+        </p:nvSpPr>
+        <p:spPr>
+          <a:xfrm>
+            <a:off x="604837" y="4795123"/>
+            <a:ext cx="388739" cy="388739"/>
+          </a:xfrm>
+          <a:prstGeom prst="roundRect">
+            <a:avLst>
+              <a:gd name="adj" fmla="val 6669"/>
+            </a:avLst>
+          </a:prstGeom>
+          <a:solidFill>
+            <a:srgbClr val="3E3E3E"/>
+          </a:solidFill>
+          <a:ln/>
+        </p:spPr>
+      </p:sp>
+      <p:sp>
+        <p:nvSpPr>
+          <p:cNvPr id="16" name="Text 12"/>
+          <p:cNvSpPr/>
+          <p:nvPr/>
+        </p:nvSpPr>
+        <p:spPr>
+          <a:xfrm>
+            <a:off x="736402" y="4859893"/>
+            <a:ext cx="125492" cy="259199"/>
+          </a:xfrm>
+          <a:prstGeom prst="rect">
+            <a:avLst/>
+          </a:prstGeom>
+          <a:noFill/>
+          <a:ln/>
+        </p:spPr>
+        <p:txBody>
+          <a:bodyPr wrap="none" rtlCol="0" anchor="t"/>
+          <a:lstStyle/>
+          <a:p>
+            <a:pPr marL="0" indent="0" algn="ctr">
+              <a:lnSpc>
+                <a:spcPts val="2041"/>
+              </a:lnSpc>
+              <a:buNone/>
+            </a:pPr>
+            <a:r>
+              <a:rPr lang="en-US" sz="2041" kern="0" spc="-20" dirty="0">
+                <a:solidFill>
+                  <a:srgbClr val="E0D6DE"/>
+                </a:solidFill>
+                <a:latin typeface="Anton" pitchFamily="34" charset="0"/>
+                <a:ea typeface="Anton" pitchFamily="34" charset="-122"/>
+                <a:cs typeface="Anton" pitchFamily="34" charset="-120"/>
+              </a:rPr>
+              <a:t>3</a:t>
+            </a:r>
+            <a:endParaRPr lang="en-US" sz="2041" dirty="0"/>
+          </a:p>
+        </p:txBody>
+      </p:sp>
+      <p:sp>
+        <p:nvSpPr>
+          <p:cNvPr id="17" name="Text 13"/>
+          <p:cNvSpPr/>
+          <p:nvPr/>
+        </p:nvSpPr>
+        <p:spPr>
+          <a:xfrm>
+            <a:off x="1166336" y="4795123"/>
+            <a:ext cx="2238732" cy="269915"/>
+          </a:xfrm>
+          <a:prstGeom prst="rect">
+            <a:avLst/>
+          </a:prstGeom>
+          <a:noFill/>
+          <a:ln/>
+        </p:spPr>
+        <p:txBody>
+          <a:bodyPr wrap="none" rtlCol="0" anchor="t"/>
+          <a:lstStyle/>
+          <a:p>
+            <a:pPr marL="0" indent="0">
+              <a:lnSpc>
+                <a:spcPts val="2126"/>
+              </a:lnSpc>
+              <a:buNone/>
+            </a:pPr>
+            <a:r>
+              <a:rPr lang="en-US" sz="1701" kern="0" spc="-17" dirty="0">
+                <a:solidFill>
+                  <a:srgbClr val="E0D6DE"/>
+                </a:solidFill>
+                <a:latin typeface="Anton" pitchFamily="34" charset="0"/>
+                <a:ea typeface="Anton" pitchFamily="34" charset="-122"/>
+                <a:cs typeface="Anton" pitchFamily="34" charset="-120"/>
+              </a:rPr>
+              <a:t>Avoiding Heavy Operations</a:t>
+            </a:r>
+            <a:endParaRPr lang="en-US" sz="1701" dirty="0"/>
+          </a:p>
+        </p:txBody>
+      </p:sp>
+      <p:sp>
+        <p:nvSpPr>
+          <p:cNvPr id="18" name="Text 14"/>
+          <p:cNvSpPr/>
+          <p:nvPr/>
+        </p:nvSpPr>
+        <p:spPr>
+          <a:xfrm>
+            <a:off x="1166336" y="5168622"/>
+            <a:ext cx="7372826" cy="553164"/>
+          </a:xfrm>
+          <a:prstGeom prst="rect">
+            <a:avLst/>
+          </a:prstGeom>
+          <a:noFill/>
+          <a:ln/>
+        </p:spPr>
+        <p:txBody>
+          <a:bodyPr wrap="square" rtlCol="0" anchor="t"/>
+          <a:lstStyle/>
+          <a:p>
+            <a:pPr marL="0" indent="0">
+              <a:lnSpc>
+                <a:spcPts val="2177"/>
+              </a:lnSpc>
+              <a:buNone/>
+            </a:pPr>
+            <a:r>
+              <a:rPr lang="en-US" sz="1361" kern="0" spc="-27" dirty="0">
+                <a:solidFill>
+                  <a:srgbClr val="E0D6DE"/>
+                </a:solidFill>
+                <a:latin typeface="Fira Sans" pitchFamily="34" charset="0"/>
+                <a:ea typeface="Fira Sans" pitchFamily="34" charset="-122"/>
+                <a:cs typeface="Fira Sans" pitchFamily="34" charset="-120"/>
+              </a:rPr>
+              <a:t>Minimize heavy operations on the main thread to prevent performance degradation. Offload intensive tasks to background threads or dedicated worker processes.</a:t>
+            </a:r>
+            <a:endParaRPr lang="en-US" sz="1361" dirty="0"/>
+          </a:p>
+        </p:txBody>
+      </p:sp>
+      <p:sp>
+        <p:nvSpPr>
+          <p:cNvPr id="19" name="Shape 15"/>
+          <p:cNvSpPr/>
+          <p:nvPr/>
+        </p:nvSpPr>
+        <p:spPr>
+          <a:xfrm>
+            <a:off x="604837" y="6088856"/>
+            <a:ext cx="388739" cy="388739"/>
+          </a:xfrm>
+          <a:prstGeom prst="roundRect">
+            <a:avLst>
+              <a:gd name="adj" fmla="val 6669"/>
+            </a:avLst>
+          </a:prstGeom>
+          <a:solidFill>
+            <a:srgbClr val="3E3E3E"/>
+          </a:solidFill>
+          <a:ln/>
+        </p:spPr>
+      </p:sp>
+      <p:sp>
+        <p:nvSpPr>
+          <p:cNvPr id="20" name="Text 16"/>
+          <p:cNvSpPr/>
+          <p:nvPr/>
+        </p:nvSpPr>
+        <p:spPr>
+          <a:xfrm>
+            <a:off x="736402" y="6153626"/>
+            <a:ext cx="125492" cy="259199"/>
+          </a:xfrm>
+          <a:prstGeom prst="rect">
+            <a:avLst/>
+          </a:prstGeom>
+          <a:noFill/>
+          <a:ln/>
+        </p:spPr>
+        <p:txBody>
+          <a:bodyPr wrap="none" rtlCol="0" anchor="t"/>
+          <a:lstStyle/>
+          <a:p>
+            <a:pPr marL="0" indent="0" algn="ctr">
+              <a:lnSpc>
+                <a:spcPts val="2041"/>
+              </a:lnSpc>
+              <a:buNone/>
+            </a:pPr>
+            <a:r>
+              <a:rPr lang="en-US" sz="2041" kern="0" spc="-20" dirty="0">
+                <a:solidFill>
+                  <a:srgbClr val="E0D6DE"/>
+                </a:solidFill>
+                <a:latin typeface="Anton" pitchFamily="34" charset="0"/>
+                <a:ea typeface="Anton" pitchFamily="34" charset="-122"/>
+                <a:cs typeface="Anton" pitchFamily="34" charset="-120"/>
+              </a:rPr>
+              <a:t>4</a:t>
+            </a:r>
+            <a:endParaRPr lang="en-US" sz="2041" dirty="0"/>
+          </a:p>
+        </p:txBody>
+      </p:sp>
+      <p:sp>
+        <p:nvSpPr>
+          <p:cNvPr id="21" name="Text 17"/>
+          <p:cNvSpPr/>
+          <p:nvPr/>
+        </p:nvSpPr>
+        <p:spPr>
+          <a:xfrm>
+            <a:off x="1166336" y="6088856"/>
+            <a:ext cx="2160270" cy="269915"/>
+          </a:xfrm>
+          <a:prstGeom prst="rect">
+            <a:avLst/>
+          </a:prstGeom>
+          <a:noFill/>
+          <a:ln/>
+        </p:spPr>
+        <p:txBody>
+          <a:bodyPr wrap="none" rtlCol="0" anchor="t"/>
+          <a:lstStyle/>
+          <a:p>
+            <a:pPr marL="0" indent="0">
+              <a:lnSpc>
+                <a:spcPts val="2126"/>
+              </a:lnSpc>
+              <a:buNone/>
+            </a:pPr>
+            <a:r>
+              <a:rPr lang="en-US" sz="1701" kern="0" spc="-17" dirty="0">
+                <a:solidFill>
+                  <a:srgbClr val="E0D6DE"/>
+                </a:solidFill>
+                <a:latin typeface="Anton" pitchFamily="34" charset="0"/>
+                <a:ea typeface="Anton" pitchFamily="34" charset="-122"/>
+                <a:cs typeface="Anton" pitchFamily="34" charset="-120"/>
+              </a:rPr>
+              <a:t>Performance Impact</a:t>
+            </a:r>
+            <a:endParaRPr lang="en-US" sz="1701" dirty="0"/>
+          </a:p>
+        </p:txBody>
+      </p:sp>
+      <p:sp>
+        <p:nvSpPr>
+          <p:cNvPr id="22" name="Text 18"/>
+          <p:cNvSpPr/>
+          <p:nvPr/>
+        </p:nvSpPr>
+        <p:spPr>
+          <a:xfrm>
+            <a:off x="1166336" y="6462355"/>
+            <a:ext cx="7372826" cy="553164"/>
+          </a:xfrm>
+          <a:prstGeom prst="rect">
+            <a:avLst/>
+          </a:prstGeom>
+          <a:noFill/>
+          <a:ln/>
+        </p:spPr>
+        <p:txBody>
+          <a:bodyPr wrap="square" rtlCol="0" anchor="t"/>
+          <a:lstStyle/>
+          <a:p>
+            <a:pPr marL="0" indent="0">
+              <a:lnSpc>
+                <a:spcPts val="2177"/>
+              </a:lnSpc>
+              <a:buNone/>
+            </a:pPr>
+            <a:r>
+              <a:rPr lang="en-US" sz="1361" kern="0" spc="-27" dirty="0">
+                <a:solidFill>
+                  <a:srgbClr val="E0D6DE"/>
+                </a:solidFill>
+                <a:latin typeface="Fira Sans" pitchFamily="34" charset="0"/>
+                <a:ea typeface="Fira Sans" pitchFamily="34" charset="-122"/>
+                <a:cs typeface="Fira Sans" pitchFamily="34" charset="-120"/>
+              </a:rPr>
+              <a:t>Carefully consider the impact of scheduling on application performance. Optimize tasks and schedules to minimize resource consumption and ensure optimal throughput.</a:t>
+            </a:r>
+            <a:endParaRPr lang="en-US" sz="1361" dirty="0"/>
           </a:p>
         </p:txBody>
       </p:sp>

</xml_diff>